<commit_message>
updated legend template in pptx and final legend image
</commit_message>
<xml_diff>
--- a/legend_maker.pptx
+++ b/legend_maker.pptx
@@ -2,19 +2,21 @@
 <file path=ppt/presentation.xml><?xml version="1.0" encoding="utf-8"?>
 <p:presentation xmlns:a="http://schemas.openxmlformats.org/drawingml/2006/main" xmlns:r="http://schemas.openxmlformats.org/officeDocument/2006/relationships" xmlns:p="http://schemas.openxmlformats.org/presentationml/2006/main" autoCompressPictures="0">
   <p:sldMasterIdLst>
-    <p:sldMasterId id="2147483648" r:id="rId1"/>
+    <p:sldMasterId id="2147483672" r:id="rId1"/>
   </p:sldMasterIdLst>
+  <p:notesMasterIdLst>
+    <p:notesMasterId r:id="rId3"/>
+  </p:notesMasterIdLst>
   <p:sldIdLst>
     <p:sldId id="256" r:id="rId2"/>
-    <p:sldId id="257" r:id="rId3"/>
   </p:sldIdLst>
-  <p:sldSz cx="12192000" cy="6858000"/>
+  <p:sldSz cx="12192000" cy="5724525"/>
   <p:notesSz cx="6858000" cy="9144000"/>
   <p:defaultTextStyle>
     <a:defPPr>
       <a:defRPr lang="en-US"/>
     </a:defPPr>
-    <a:lvl1pPr marL="0" algn="l" defTabSz="914400" rtl="0" eaLnBrk="1" latinLnBrk="0" hangingPunct="1">
+    <a:lvl1pPr marL="0" algn="l" defTabSz="457200" rtl="0" eaLnBrk="1" latinLnBrk="0" hangingPunct="1">
       <a:defRPr sz="1800" kern="1200">
         <a:solidFill>
           <a:schemeClr val="tx1"/>
@@ -24,7 +26,7 @@
         <a:cs typeface="+mn-cs"/>
       </a:defRPr>
     </a:lvl1pPr>
-    <a:lvl2pPr marL="457200" algn="l" defTabSz="914400" rtl="0" eaLnBrk="1" latinLnBrk="0" hangingPunct="1">
+    <a:lvl2pPr marL="457200" algn="l" defTabSz="457200" rtl="0" eaLnBrk="1" latinLnBrk="0" hangingPunct="1">
       <a:defRPr sz="1800" kern="1200">
         <a:solidFill>
           <a:schemeClr val="tx1"/>
@@ -34,7 +36,7 @@
         <a:cs typeface="+mn-cs"/>
       </a:defRPr>
     </a:lvl2pPr>
-    <a:lvl3pPr marL="914400" algn="l" defTabSz="914400" rtl="0" eaLnBrk="1" latinLnBrk="0" hangingPunct="1">
+    <a:lvl3pPr marL="914400" algn="l" defTabSz="457200" rtl="0" eaLnBrk="1" latinLnBrk="0" hangingPunct="1">
       <a:defRPr sz="1800" kern="1200">
         <a:solidFill>
           <a:schemeClr val="tx1"/>
@@ -44,7 +46,7 @@
         <a:cs typeface="+mn-cs"/>
       </a:defRPr>
     </a:lvl3pPr>
-    <a:lvl4pPr marL="1371600" algn="l" defTabSz="914400" rtl="0" eaLnBrk="1" latinLnBrk="0" hangingPunct="1">
+    <a:lvl4pPr marL="1371600" algn="l" defTabSz="457200" rtl="0" eaLnBrk="1" latinLnBrk="0" hangingPunct="1">
       <a:defRPr sz="1800" kern="1200">
         <a:solidFill>
           <a:schemeClr val="tx1"/>
@@ -54,7 +56,7 @@
         <a:cs typeface="+mn-cs"/>
       </a:defRPr>
     </a:lvl4pPr>
-    <a:lvl5pPr marL="1828800" algn="l" defTabSz="914400" rtl="0" eaLnBrk="1" latinLnBrk="0" hangingPunct="1">
+    <a:lvl5pPr marL="1828800" algn="l" defTabSz="457200" rtl="0" eaLnBrk="1" latinLnBrk="0" hangingPunct="1">
       <a:defRPr sz="1800" kern="1200">
         <a:solidFill>
           <a:schemeClr val="tx1"/>
@@ -64,7 +66,7 @@
         <a:cs typeface="+mn-cs"/>
       </a:defRPr>
     </a:lvl5pPr>
-    <a:lvl6pPr marL="2286000" algn="l" defTabSz="914400" rtl="0" eaLnBrk="1" latinLnBrk="0" hangingPunct="1">
+    <a:lvl6pPr marL="2286000" algn="l" defTabSz="457200" rtl="0" eaLnBrk="1" latinLnBrk="0" hangingPunct="1">
       <a:defRPr sz="1800" kern="1200">
         <a:solidFill>
           <a:schemeClr val="tx1"/>
@@ -74,7 +76,7 @@
         <a:cs typeface="+mn-cs"/>
       </a:defRPr>
     </a:lvl6pPr>
-    <a:lvl7pPr marL="2743200" algn="l" defTabSz="914400" rtl="0" eaLnBrk="1" latinLnBrk="0" hangingPunct="1">
+    <a:lvl7pPr marL="2743200" algn="l" defTabSz="457200" rtl="0" eaLnBrk="1" latinLnBrk="0" hangingPunct="1">
       <a:defRPr sz="1800" kern="1200">
         <a:solidFill>
           <a:schemeClr val="tx1"/>
@@ -84,7 +86,7 @@
         <a:cs typeface="+mn-cs"/>
       </a:defRPr>
     </a:lvl7pPr>
-    <a:lvl8pPr marL="3200400" algn="l" defTabSz="914400" rtl="0" eaLnBrk="1" latinLnBrk="0" hangingPunct="1">
+    <a:lvl8pPr marL="3200400" algn="l" defTabSz="457200" rtl="0" eaLnBrk="1" latinLnBrk="0" hangingPunct="1">
       <a:defRPr sz="1800" kern="1200">
         <a:solidFill>
           <a:schemeClr val="tx1"/>
@@ -94,7 +96,7 @@
         <a:cs typeface="+mn-cs"/>
       </a:defRPr>
     </a:lvl8pPr>
-    <a:lvl9pPr marL="3657600" algn="l" defTabSz="914400" rtl="0" eaLnBrk="1" latinLnBrk="0" hangingPunct="1">
+    <a:lvl9pPr marL="3657600" algn="l" defTabSz="457200" rtl="0" eaLnBrk="1" latinLnBrk="0" hangingPunct="1">
       <a:defRPr sz="1800" kern="1200">
         <a:solidFill>
           <a:schemeClr val="tx1"/>
@@ -105,7 +107,461 @@
       </a:defRPr>
     </a:lvl9pPr>
   </p:defaultTextStyle>
+  <p:extLst>
+    <p:ext uri="{EFAFB233-063F-42B5-8137-9DF3F51BA10A}">
+      <p15:sldGuideLst xmlns:p15="http://schemas.microsoft.com/office/powerpoint/2012/main"/>
+    </p:ext>
+  </p:extLst>
 </p:presentation>
+</file>
+
+<file path=ppt/notesMasters/notesMaster1.xml><?xml version="1.0" encoding="utf-8"?>
+<p:notesMaster xmlns:a="http://schemas.openxmlformats.org/drawingml/2006/main" xmlns:r="http://schemas.openxmlformats.org/officeDocument/2006/relationships" xmlns:p="http://schemas.openxmlformats.org/presentationml/2006/main">
+  <p:cSld>
+    <p:bg>
+      <p:bgRef idx="1001">
+        <a:schemeClr val="bg1"/>
+      </p:bgRef>
+    </p:bg>
+    <p:spTree>
+      <p:nvGrpSpPr>
+        <p:cNvPr id="1" name=""/>
+        <p:cNvGrpSpPr/>
+        <p:nvPr/>
+      </p:nvGrpSpPr>
+      <p:grpSpPr>
+        <a:xfrm>
+          <a:off x="0" y="0"/>
+          <a:ext cx="0" cy="0"/>
+          <a:chOff x="0" y="0"/>
+          <a:chExt cx="0" cy="0"/>
+        </a:xfrm>
+      </p:grpSpPr>
+      <p:sp>
+        <p:nvSpPr>
+          <p:cNvPr id="2" name="Header Placeholder 1"/>
+          <p:cNvSpPr>
+            <a:spLocks noGrp="1"/>
+          </p:cNvSpPr>
+          <p:nvPr>
+            <p:ph type="hdr" sz="quarter"/>
+          </p:nvPr>
+        </p:nvSpPr>
+        <p:spPr>
+          <a:xfrm>
+            <a:off x="0" y="0"/>
+            <a:ext cx="2971800" cy="458788"/>
+          </a:xfrm>
+          <a:prstGeom prst="rect">
+            <a:avLst/>
+          </a:prstGeom>
+        </p:spPr>
+        <p:txBody>
+          <a:bodyPr vert="horz" lIns="91440" tIns="45720" rIns="91440" bIns="45720" rtlCol="0"/>
+          <a:lstStyle>
+            <a:lvl1pPr algn="l">
+              <a:defRPr sz="1200"/>
+            </a:lvl1pPr>
+          </a:lstStyle>
+          <a:p>
+            <a:endParaRPr lang="en-US"/>
+          </a:p>
+        </p:txBody>
+      </p:sp>
+      <p:sp>
+        <p:nvSpPr>
+          <p:cNvPr id="3" name="Date Placeholder 2"/>
+          <p:cNvSpPr>
+            <a:spLocks noGrp="1"/>
+          </p:cNvSpPr>
+          <p:nvPr>
+            <p:ph type="dt" idx="1"/>
+          </p:nvPr>
+        </p:nvSpPr>
+        <p:spPr>
+          <a:xfrm>
+            <a:off x="3884613" y="0"/>
+            <a:ext cx="2971800" cy="458788"/>
+          </a:xfrm>
+          <a:prstGeom prst="rect">
+            <a:avLst/>
+          </a:prstGeom>
+        </p:spPr>
+        <p:txBody>
+          <a:bodyPr vert="horz" lIns="91440" tIns="45720" rIns="91440" bIns="45720" rtlCol="0"/>
+          <a:lstStyle>
+            <a:lvl1pPr algn="r">
+              <a:defRPr sz="1200"/>
+            </a:lvl1pPr>
+          </a:lstStyle>
+          <a:p>
+            <a:fld id="{F264D2D9-EE3E-2C45-841F-E65DE15A6112}" type="datetimeFigureOut">
+              <a:rPr lang="en-US" smtClean="0"/>
+              <a:t>5/11/20</a:t>
+            </a:fld>
+            <a:endParaRPr lang="en-US"/>
+          </a:p>
+        </p:txBody>
+      </p:sp>
+      <p:sp>
+        <p:nvSpPr>
+          <p:cNvPr id="4" name="Slide Image Placeholder 3"/>
+          <p:cNvSpPr>
+            <a:spLocks noGrp="1" noRot="1" noChangeAspect="1"/>
+          </p:cNvSpPr>
+          <p:nvPr>
+            <p:ph type="sldImg" idx="2"/>
+          </p:nvPr>
+        </p:nvSpPr>
+        <p:spPr>
+          <a:xfrm>
+            <a:off x="142875" y="1143000"/>
+            <a:ext cx="6572250" cy="3086100"/>
+          </a:xfrm>
+          <a:prstGeom prst="rect">
+            <a:avLst/>
+          </a:prstGeom>
+          <a:noFill/>
+          <a:ln w="12700">
+            <a:solidFill>
+              <a:prstClr val="black"/>
+            </a:solidFill>
+          </a:ln>
+        </p:spPr>
+        <p:txBody>
+          <a:bodyPr vert="horz" lIns="91440" tIns="45720" rIns="91440" bIns="45720" rtlCol="0" anchor="ctr"/>
+          <a:lstStyle/>
+          <a:p>
+            <a:endParaRPr lang="en-US"/>
+          </a:p>
+        </p:txBody>
+      </p:sp>
+      <p:sp>
+        <p:nvSpPr>
+          <p:cNvPr id="5" name="Notes Placeholder 4"/>
+          <p:cNvSpPr>
+            <a:spLocks noGrp="1"/>
+          </p:cNvSpPr>
+          <p:nvPr>
+            <p:ph type="body" sz="quarter" idx="3"/>
+          </p:nvPr>
+        </p:nvSpPr>
+        <p:spPr>
+          <a:xfrm>
+            <a:off x="685800" y="4400550"/>
+            <a:ext cx="5486400" cy="3600450"/>
+          </a:xfrm>
+          <a:prstGeom prst="rect">
+            <a:avLst/>
+          </a:prstGeom>
+        </p:spPr>
+        <p:txBody>
+          <a:bodyPr vert="horz" lIns="91440" tIns="45720" rIns="91440" bIns="45720" rtlCol="0"/>
+          <a:lstStyle/>
+          <a:p>
+            <a:pPr lvl="0"/>
+            <a:r>
+              <a:rPr lang="en-GB"/>
+              <a:t>Click to edit Master text styles</a:t>
+            </a:r>
+          </a:p>
+          <a:p>
+            <a:pPr lvl="1"/>
+            <a:r>
+              <a:rPr lang="en-GB"/>
+              <a:t>Second level</a:t>
+            </a:r>
+          </a:p>
+          <a:p>
+            <a:pPr lvl="2"/>
+            <a:r>
+              <a:rPr lang="en-GB"/>
+              <a:t>Third level</a:t>
+            </a:r>
+          </a:p>
+          <a:p>
+            <a:pPr lvl="3"/>
+            <a:r>
+              <a:rPr lang="en-GB"/>
+              <a:t>Fourth level</a:t>
+            </a:r>
+          </a:p>
+          <a:p>
+            <a:pPr lvl="4"/>
+            <a:r>
+              <a:rPr lang="en-GB"/>
+              <a:t>Fifth level</a:t>
+            </a:r>
+            <a:endParaRPr lang="en-US"/>
+          </a:p>
+        </p:txBody>
+      </p:sp>
+      <p:sp>
+        <p:nvSpPr>
+          <p:cNvPr id="6" name="Footer Placeholder 5"/>
+          <p:cNvSpPr>
+            <a:spLocks noGrp="1"/>
+          </p:cNvSpPr>
+          <p:nvPr>
+            <p:ph type="ftr" sz="quarter" idx="4"/>
+          </p:nvPr>
+        </p:nvSpPr>
+        <p:spPr>
+          <a:xfrm>
+            <a:off x="0" y="8685213"/>
+            <a:ext cx="2971800" cy="458787"/>
+          </a:xfrm>
+          <a:prstGeom prst="rect">
+            <a:avLst/>
+          </a:prstGeom>
+        </p:spPr>
+        <p:txBody>
+          <a:bodyPr vert="horz" lIns="91440" tIns="45720" rIns="91440" bIns="45720" rtlCol="0" anchor="b"/>
+          <a:lstStyle>
+            <a:lvl1pPr algn="l">
+              <a:defRPr sz="1200"/>
+            </a:lvl1pPr>
+          </a:lstStyle>
+          <a:p>
+            <a:endParaRPr lang="en-US"/>
+          </a:p>
+        </p:txBody>
+      </p:sp>
+      <p:sp>
+        <p:nvSpPr>
+          <p:cNvPr id="7" name="Slide Number Placeholder 6"/>
+          <p:cNvSpPr>
+            <a:spLocks noGrp="1"/>
+          </p:cNvSpPr>
+          <p:nvPr>
+            <p:ph type="sldNum" sz="quarter" idx="5"/>
+          </p:nvPr>
+        </p:nvSpPr>
+        <p:spPr>
+          <a:xfrm>
+            <a:off x="3884613" y="8685213"/>
+            <a:ext cx="2971800" cy="458787"/>
+          </a:xfrm>
+          <a:prstGeom prst="rect">
+            <a:avLst/>
+          </a:prstGeom>
+        </p:spPr>
+        <p:txBody>
+          <a:bodyPr vert="horz" lIns="91440" tIns="45720" rIns="91440" bIns="45720" rtlCol="0" anchor="b"/>
+          <a:lstStyle>
+            <a:lvl1pPr algn="r">
+              <a:defRPr sz="1200"/>
+            </a:lvl1pPr>
+          </a:lstStyle>
+          <a:p>
+            <a:fld id="{289A73D6-479C-A248-A957-9FE78ED38C2E}" type="slidenum">
+              <a:rPr lang="en-US" smtClean="0"/>
+              <a:t>‹#›</a:t>
+            </a:fld>
+            <a:endParaRPr lang="en-US"/>
+          </a:p>
+        </p:txBody>
+      </p:sp>
+    </p:spTree>
+    <p:extLst>
+      <p:ext uri="{BB962C8B-B14F-4D97-AF65-F5344CB8AC3E}">
+        <p14:creationId xmlns:p14="http://schemas.microsoft.com/office/powerpoint/2010/main" val="2368760369"/>
+      </p:ext>
+    </p:extLst>
+  </p:cSld>
+  <p:clrMap bg1="lt1" tx1="dk1" bg2="lt2" tx2="dk2" accent1="accent1" accent2="accent2" accent3="accent3" accent4="accent4" accent5="accent5" accent6="accent6" hlink="hlink" folHlink="folHlink"/>
+  <p:notesStyle>
+    <a:lvl1pPr marL="0" algn="l" defTabSz="913996" rtl="0" eaLnBrk="1" latinLnBrk="0" hangingPunct="1">
+      <a:defRPr sz="1197" kern="1200">
+        <a:solidFill>
+          <a:schemeClr val="tx1"/>
+        </a:solidFill>
+        <a:latin typeface="+mn-lt"/>
+        <a:ea typeface="+mn-ea"/>
+        <a:cs typeface="+mn-cs"/>
+      </a:defRPr>
+    </a:lvl1pPr>
+    <a:lvl2pPr marL="456998" algn="l" defTabSz="913996" rtl="0" eaLnBrk="1" latinLnBrk="0" hangingPunct="1">
+      <a:defRPr sz="1197" kern="1200">
+        <a:solidFill>
+          <a:schemeClr val="tx1"/>
+        </a:solidFill>
+        <a:latin typeface="+mn-lt"/>
+        <a:ea typeface="+mn-ea"/>
+        <a:cs typeface="+mn-cs"/>
+      </a:defRPr>
+    </a:lvl2pPr>
+    <a:lvl3pPr marL="913996" algn="l" defTabSz="913996" rtl="0" eaLnBrk="1" latinLnBrk="0" hangingPunct="1">
+      <a:defRPr sz="1197" kern="1200">
+        <a:solidFill>
+          <a:schemeClr val="tx1"/>
+        </a:solidFill>
+        <a:latin typeface="+mn-lt"/>
+        <a:ea typeface="+mn-ea"/>
+        <a:cs typeface="+mn-cs"/>
+      </a:defRPr>
+    </a:lvl3pPr>
+    <a:lvl4pPr marL="1370994" algn="l" defTabSz="913996" rtl="0" eaLnBrk="1" latinLnBrk="0" hangingPunct="1">
+      <a:defRPr sz="1197" kern="1200">
+        <a:solidFill>
+          <a:schemeClr val="tx1"/>
+        </a:solidFill>
+        <a:latin typeface="+mn-lt"/>
+        <a:ea typeface="+mn-ea"/>
+        <a:cs typeface="+mn-cs"/>
+      </a:defRPr>
+    </a:lvl4pPr>
+    <a:lvl5pPr marL="1827991" algn="l" defTabSz="913996" rtl="0" eaLnBrk="1" latinLnBrk="0" hangingPunct="1">
+      <a:defRPr sz="1197" kern="1200">
+        <a:solidFill>
+          <a:schemeClr val="tx1"/>
+        </a:solidFill>
+        <a:latin typeface="+mn-lt"/>
+        <a:ea typeface="+mn-ea"/>
+        <a:cs typeface="+mn-cs"/>
+      </a:defRPr>
+    </a:lvl5pPr>
+    <a:lvl6pPr marL="2284989" algn="l" defTabSz="913996" rtl="0" eaLnBrk="1" latinLnBrk="0" hangingPunct="1">
+      <a:defRPr sz="1197" kern="1200">
+        <a:solidFill>
+          <a:schemeClr val="tx1"/>
+        </a:solidFill>
+        <a:latin typeface="+mn-lt"/>
+        <a:ea typeface="+mn-ea"/>
+        <a:cs typeface="+mn-cs"/>
+      </a:defRPr>
+    </a:lvl6pPr>
+    <a:lvl7pPr marL="2741987" algn="l" defTabSz="913996" rtl="0" eaLnBrk="1" latinLnBrk="0" hangingPunct="1">
+      <a:defRPr sz="1197" kern="1200">
+        <a:solidFill>
+          <a:schemeClr val="tx1"/>
+        </a:solidFill>
+        <a:latin typeface="+mn-lt"/>
+        <a:ea typeface="+mn-ea"/>
+        <a:cs typeface="+mn-cs"/>
+      </a:defRPr>
+    </a:lvl7pPr>
+    <a:lvl8pPr marL="3198978" algn="l" defTabSz="913996" rtl="0" eaLnBrk="1" latinLnBrk="0" hangingPunct="1">
+      <a:defRPr sz="1197" kern="1200">
+        <a:solidFill>
+          <a:schemeClr val="tx1"/>
+        </a:solidFill>
+        <a:latin typeface="+mn-lt"/>
+        <a:ea typeface="+mn-ea"/>
+        <a:cs typeface="+mn-cs"/>
+      </a:defRPr>
+    </a:lvl8pPr>
+    <a:lvl9pPr marL="3655976" algn="l" defTabSz="913996" rtl="0" eaLnBrk="1" latinLnBrk="0" hangingPunct="1">
+      <a:defRPr sz="1197" kern="1200">
+        <a:solidFill>
+          <a:schemeClr val="tx1"/>
+        </a:solidFill>
+        <a:latin typeface="+mn-lt"/>
+        <a:ea typeface="+mn-ea"/>
+        <a:cs typeface="+mn-cs"/>
+      </a:defRPr>
+    </a:lvl9pPr>
+  </p:notesStyle>
+</p:notesMaster>
+</file>
+
+<file path=ppt/notesSlides/notesSlide1.xml><?xml version="1.0" encoding="utf-8"?>
+<p:notes xmlns:a="http://schemas.openxmlformats.org/drawingml/2006/main" xmlns:r="http://schemas.openxmlformats.org/officeDocument/2006/relationships" xmlns:p="http://schemas.openxmlformats.org/presentationml/2006/main">
+  <p:cSld>
+    <p:spTree>
+      <p:nvGrpSpPr>
+        <p:cNvPr id="1" name=""/>
+        <p:cNvGrpSpPr/>
+        <p:nvPr/>
+      </p:nvGrpSpPr>
+      <p:grpSpPr>
+        <a:xfrm>
+          <a:off x="0" y="0"/>
+          <a:ext cx="0" cy="0"/>
+          <a:chOff x="0" y="0"/>
+          <a:chExt cx="0" cy="0"/>
+        </a:xfrm>
+      </p:grpSpPr>
+      <p:sp>
+        <p:nvSpPr>
+          <p:cNvPr id="2" name="Slide Image Placeholder 1"/>
+          <p:cNvSpPr>
+            <a:spLocks noGrp="1" noRot="1" noChangeAspect="1"/>
+          </p:cNvSpPr>
+          <p:nvPr>
+            <p:ph type="sldImg"/>
+          </p:nvPr>
+        </p:nvSpPr>
+        <p:spPr/>
+      </p:sp>
+      <p:sp>
+        <p:nvSpPr>
+          <p:cNvPr id="3" name="Notes Placeholder 2"/>
+          <p:cNvSpPr>
+            <a:spLocks noGrp="1"/>
+          </p:cNvSpPr>
+          <p:nvPr>
+            <p:ph type="body" idx="1"/>
+          </p:nvPr>
+        </p:nvSpPr>
+        <p:spPr/>
+        <p:txBody>
+          <a:bodyPr/>
+          <a:lstStyle/>
+          <a:p>
+            <a:r>
+              <a:rPr lang="en-US" dirty="0"/>
+              <a:t>Export as </a:t>
+            </a:r>
+            <a:r>
+              <a:rPr lang="en-US" dirty="0" err="1"/>
+              <a:t>png</a:t>
+            </a:r>
+            <a:r>
+              <a:rPr lang="en-US" dirty="0"/>
+              <a:t>, </a:t>
+            </a:r>
+            <a:r>
+              <a:rPr lang="en-US"/>
+              <a:t>250px wide</a:t>
+            </a:r>
+          </a:p>
+        </p:txBody>
+      </p:sp>
+      <p:sp>
+        <p:nvSpPr>
+          <p:cNvPr id="4" name="Slide Number Placeholder 3"/>
+          <p:cNvSpPr>
+            <a:spLocks noGrp="1"/>
+          </p:cNvSpPr>
+          <p:nvPr>
+            <p:ph type="sldNum" sz="quarter" idx="5"/>
+          </p:nvPr>
+        </p:nvSpPr>
+        <p:spPr/>
+        <p:txBody>
+          <a:bodyPr/>
+          <a:lstStyle/>
+          <a:p>
+            <a:fld id="{289A73D6-479C-A248-A957-9FE78ED38C2E}" type="slidenum">
+              <a:rPr lang="en-US" smtClean="0"/>
+              <a:t>1</a:t>
+            </a:fld>
+            <a:endParaRPr lang="en-US"/>
+          </a:p>
+        </p:txBody>
+      </p:sp>
+    </p:spTree>
+    <p:extLst>
+      <p:ext uri="{BB962C8B-B14F-4D97-AF65-F5344CB8AC3E}">
+        <p14:creationId xmlns:p14="http://schemas.microsoft.com/office/powerpoint/2010/main" val="1958031713"/>
+      </p:ext>
+    </p:extLst>
+  </p:cSld>
+  <p:clrMapOvr>
+    <a:masterClrMapping/>
+  </p:clrMapOvr>
+</p:notes>
 </file>
 
 <file path=ppt/slideLayouts/slideLayout1.xml><?xml version="1.0" encoding="utf-8"?>
@@ -127,13 +583,7 @@
       </p:grpSpPr>
       <p:sp>
         <p:nvSpPr>
-          <p:cNvPr id="2" name="Title 1">
-            <a:extLst>
-              <a:ext uri="{FF2B5EF4-FFF2-40B4-BE49-F238E27FC236}">
-                <a16:creationId xmlns:a16="http://schemas.microsoft.com/office/drawing/2014/main" id="{7011B762-97E2-3F44-844A-C17278E6BAD9}"/>
-              </a:ext>
-            </a:extLst>
-          </p:cNvPr>
+          <p:cNvPr id="2" name="Title 1"/>
           <p:cNvSpPr>
             <a:spLocks noGrp="1"/>
           </p:cNvSpPr>
@@ -143,15 +593,15 @@
         </p:nvSpPr>
         <p:spPr>
           <a:xfrm>
-            <a:off x="1524000" y="1122363"/>
-            <a:ext cx="9144000" cy="2387600"/>
+            <a:off x="1524000" y="936861"/>
+            <a:ext cx="9144000" cy="1992983"/>
           </a:xfrm>
         </p:spPr>
         <p:txBody>
           <a:bodyPr anchor="b"/>
           <a:lstStyle>
             <a:lvl1pPr algn="ctr">
-              <a:defRPr sz="6000"/>
+              <a:defRPr sz="5008"/>
             </a:lvl1pPr>
           </a:lstStyle>
           <a:p>
@@ -159,19 +609,13 @@
               <a:rPr lang="en-GB"/>
               <a:t>Click to edit Master title style</a:t>
             </a:r>
-            <a:endParaRPr lang="en-US"/>
-          </a:p>
-        </p:txBody>
-      </p:sp>
-      <p:sp>
-        <p:nvSpPr>
-          <p:cNvPr id="3" name="Subtitle 2">
-            <a:extLst>
-              <a:ext uri="{FF2B5EF4-FFF2-40B4-BE49-F238E27FC236}">
-                <a16:creationId xmlns:a16="http://schemas.microsoft.com/office/drawing/2014/main" id="{0D930285-ED56-4C48-B014-FDBECAEBD2DB}"/>
-              </a:ext>
-            </a:extLst>
-          </p:cNvPr>
+            <a:endParaRPr lang="en-US" dirty="0"/>
+          </a:p>
+        </p:txBody>
+      </p:sp>
+      <p:sp>
+        <p:nvSpPr>
+          <p:cNvPr id="3" name="Subtitle 2"/>
           <p:cNvSpPr>
             <a:spLocks noGrp="1"/>
           </p:cNvSpPr>
@@ -181,8 +625,8 @@
         </p:nvSpPr>
         <p:spPr>
           <a:xfrm>
-            <a:off x="1524000" y="3602038"/>
-            <a:ext cx="9144000" cy="1655762"/>
+            <a:off x="1524000" y="3006701"/>
+            <a:ext cx="9144000" cy="1382101"/>
           </a:xfrm>
         </p:spPr>
         <p:txBody>
@@ -190,39 +634,39 @@
           <a:lstStyle>
             <a:lvl1pPr marL="0" indent="0" algn="ctr">
               <a:buNone/>
-              <a:defRPr sz="2400"/>
+              <a:defRPr sz="2003"/>
             </a:lvl1pPr>
-            <a:lvl2pPr marL="457200" indent="0" algn="ctr">
-              <a:buNone/>
-              <a:defRPr sz="2000"/>
+            <a:lvl2pPr marL="381625" indent="0" algn="ctr">
+              <a:buNone/>
+              <a:defRPr sz="1669"/>
             </a:lvl2pPr>
-            <a:lvl3pPr marL="914400" indent="0" algn="ctr">
-              <a:buNone/>
-              <a:defRPr sz="1800"/>
+            <a:lvl3pPr marL="763250" indent="0" algn="ctr">
+              <a:buNone/>
+              <a:defRPr sz="1502"/>
             </a:lvl3pPr>
-            <a:lvl4pPr marL="1371600" indent="0" algn="ctr">
-              <a:buNone/>
-              <a:defRPr sz="1600"/>
+            <a:lvl4pPr marL="1144875" indent="0" algn="ctr">
+              <a:buNone/>
+              <a:defRPr sz="1336"/>
             </a:lvl4pPr>
-            <a:lvl5pPr marL="1828800" indent="0" algn="ctr">
-              <a:buNone/>
-              <a:defRPr sz="1600"/>
+            <a:lvl5pPr marL="1526499" indent="0" algn="ctr">
+              <a:buNone/>
+              <a:defRPr sz="1336"/>
             </a:lvl5pPr>
-            <a:lvl6pPr marL="2286000" indent="0" algn="ctr">
-              <a:buNone/>
-              <a:defRPr sz="1600"/>
+            <a:lvl6pPr marL="1908124" indent="0" algn="ctr">
+              <a:buNone/>
+              <a:defRPr sz="1336"/>
             </a:lvl6pPr>
-            <a:lvl7pPr marL="2743200" indent="0" algn="ctr">
-              <a:buNone/>
-              <a:defRPr sz="1600"/>
+            <a:lvl7pPr marL="2289749" indent="0" algn="ctr">
+              <a:buNone/>
+              <a:defRPr sz="1336"/>
             </a:lvl7pPr>
-            <a:lvl8pPr marL="3200400" indent="0" algn="ctr">
-              <a:buNone/>
-              <a:defRPr sz="1600"/>
+            <a:lvl8pPr marL="2671374" indent="0" algn="ctr">
+              <a:buNone/>
+              <a:defRPr sz="1336"/>
             </a:lvl8pPr>
-            <a:lvl9pPr marL="3657600" indent="0" algn="ctr">
-              <a:buNone/>
-              <a:defRPr sz="1600"/>
+            <a:lvl9pPr marL="3052999" indent="0" algn="ctr">
+              <a:buNone/>
+              <a:defRPr sz="1336"/>
             </a:lvl9pPr>
           </a:lstStyle>
           <a:p>
@@ -230,19 +674,13 @@
               <a:rPr lang="en-GB"/>
               <a:t>Click to edit Master subtitle style</a:t>
             </a:r>
-            <a:endParaRPr lang="en-US"/>
-          </a:p>
-        </p:txBody>
-      </p:sp>
-      <p:sp>
-        <p:nvSpPr>
-          <p:cNvPr id="4" name="Date Placeholder 3">
-            <a:extLst>
-              <a:ext uri="{FF2B5EF4-FFF2-40B4-BE49-F238E27FC236}">
-                <a16:creationId xmlns:a16="http://schemas.microsoft.com/office/drawing/2014/main" id="{E3F0D834-EF68-F641-8207-E7D75F2F698D}"/>
-              </a:ext>
-            </a:extLst>
-          </p:cNvPr>
+            <a:endParaRPr lang="en-US" dirty="0"/>
+          </a:p>
+        </p:txBody>
+      </p:sp>
+      <p:sp>
+        <p:nvSpPr>
+          <p:cNvPr id="4" name="Date Placeholder 3"/>
           <p:cNvSpPr>
             <a:spLocks noGrp="1"/>
           </p:cNvSpPr>
@@ -265,13 +703,7 @@
       </p:sp>
       <p:sp>
         <p:nvSpPr>
-          <p:cNvPr id="5" name="Footer Placeholder 4">
-            <a:extLst>
-              <a:ext uri="{FF2B5EF4-FFF2-40B4-BE49-F238E27FC236}">
-                <a16:creationId xmlns:a16="http://schemas.microsoft.com/office/drawing/2014/main" id="{40E27793-D9E0-154B-8973-658FD85C2052}"/>
-              </a:ext>
-            </a:extLst>
-          </p:cNvPr>
+          <p:cNvPr id="5" name="Footer Placeholder 4"/>
           <p:cNvSpPr>
             <a:spLocks noGrp="1"/>
           </p:cNvSpPr>
@@ -290,13 +722,7 @@
       </p:sp>
       <p:sp>
         <p:nvSpPr>
-          <p:cNvPr id="6" name="Slide Number Placeholder 5">
-            <a:extLst>
-              <a:ext uri="{FF2B5EF4-FFF2-40B4-BE49-F238E27FC236}">
-                <a16:creationId xmlns:a16="http://schemas.microsoft.com/office/drawing/2014/main" id="{78A8A981-8837-9A44-99E0-336165931A55}"/>
-              </a:ext>
-            </a:extLst>
-          </p:cNvPr>
+          <p:cNvPr id="6" name="Slide Number Placeholder 5"/>
           <p:cNvSpPr>
             <a:spLocks noGrp="1"/>
           </p:cNvSpPr>
@@ -320,7 +746,7 @@
     </p:spTree>
     <p:extLst>
       <p:ext uri="{BB962C8B-B14F-4D97-AF65-F5344CB8AC3E}">
-        <p14:creationId xmlns:p14="http://schemas.microsoft.com/office/powerpoint/2010/main" val="3322767890"/>
+        <p14:creationId xmlns:p14="http://schemas.microsoft.com/office/powerpoint/2010/main" val="2443065015"/>
       </p:ext>
     </p:extLst>
   </p:cSld>
@@ -349,13 +775,7 @@
       </p:grpSpPr>
       <p:sp>
         <p:nvSpPr>
-          <p:cNvPr id="2" name="Title 1">
-            <a:extLst>
-              <a:ext uri="{FF2B5EF4-FFF2-40B4-BE49-F238E27FC236}">
-                <a16:creationId xmlns:a16="http://schemas.microsoft.com/office/drawing/2014/main" id="{1CB5CF68-DA39-724A-B848-4729D0DD9E74}"/>
-              </a:ext>
-            </a:extLst>
-          </p:cNvPr>
+          <p:cNvPr id="2" name="Title 1"/>
           <p:cNvSpPr>
             <a:spLocks noGrp="1"/>
           </p:cNvSpPr>
@@ -372,19 +792,13 @@
               <a:rPr lang="en-GB"/>
               <a:t>Click to edit Master title style</a:t>
             </a:r>
-            <a:endParaRPr lang="en-US"/>
-          </a:p>
-        </p:txBody>
-      </p:sp>
-      <p:sp>
-        <p:nvSpPr>
-          <p:cNvPr id="3" name="Vertical Text Placeholder 2">
-            <a:extLst>
-              <a:ext uri="{FF2B5EF4-FFF2-40B4-BE49-F238E27FC236}">
-                <a16:creationId xmlns:a16="http://schemas.microsoft.com/office/drawing/2014/main" id="{F80E2924-1485-4446-BCE9-B08A465E7C29}"/>
-              </a:ext>
-            </a:extLst>
-          </p:cNvPr>
+            <a:endParaRPr lang="en-US" dirty="0"/>
+          </a:p>
+        </p:txBody>
+      </p:sp>
+      <p:sp>
+        <p:nvSpPr>
+          <p:cNvPr id="3" name="Vertical Text Placeholder 2"/>
           <p:cNvSpPr>
             <a:spLocks noGrp="1"/>
           </p:cNvSpPr>
@@ -430,19 +844,13 @@
               <a:rPr lang="en-GB"/>
               <a:t>Fifth level</a:t>
             </a:r>
-            <a:endParaRPr lang="en-US"/>
-          </a:p>
-        </p:txBody>
-      </p:sp>
-      <p:sp>
-        <p:nvSpPr>
-          <p:cNvPr id="4" name="Date Placeholder 3">
-            <a:extLst>
-              <a:ext uri="{FF2B5EF4-FFF2-40B4-BE49-F238E27FC236}">
-                <a16:creationId xmlns:a16="http://schemas.microsoft.com/office/drawing/2014/main" id="{03060AE1-6222-8E4C-BF98-7F1E3BEFE2B9}"/>
-              </a:ext>
-            </a:extLst>
-          </p:cNvPr>
+            <a:endParaRPr lang="en-US" dirty="0"/>
+          </a:p>
+        </p:txBody>
+      </p:sp>
+      <p:sp>
+        <p:nvSpPr>
+          <p:cNvPr id="4" name="Date Placeholder 3"/>
           <p:cNvSpPr>
             <a:spLocks noGrp="1"/>
           </p:cNvSpPr>
@@ -465,13 +873,7 @@
       </p:sp>
       <p:sp>
         <p:nvSpPr>
-          <p:cNvPr id="5" name="Footer Placeholder 4">
-            <a:extLst>
-              <a:ext uri="{FF2B5EF4-FFF2-40B4-BE49-F238E27FC236}">
-                <a16:creationId xmlns:a16="http://schemas.microsoft.com/office/drawing/2014/main" id="{5D1C0379-CC06-6843-8D0F-68A438477E5F}"/>
-              </a:ext>
-            </a:extLst>
-          </p:cNvPr>
+          <p:cNvPr id="5" name="Footer Placeholder 4"/>
           <p:cNvSpPr>
             <a:spLocks noGrp="1"/>
           </p:cNvSpPr>
@@ -490,13 +892,7 @@
       </p:sp>
       <p:sp>
         <p:nvSpPr>
-          <p:cNvPr id="6" name="Slide Number Placeholder 5">
-            <a:extLst>
-              <a:ext uri="{FF2B5EF4-FFF2-40B4-BE49-F238E27FC236}">
-                <a16:creationId xmlns:a16="http://schemas.microsoft.com/office/drawing/2014/main" id="{581A091E-EFCB-EE4F-8199-B165B2E3C198}"/>
-              </a:ext>
-            </a:extLst>
-          </p:cNvPr>
+          <p:cNvPr id="6" name="Slide Number Placeholder 5"/>
           <p:cNvSpPr>
             <a:spLocks noGrp="1"/>
           </p:cNvSpPr>
@@ -520,7 +916,7 @@
     </p:spTree>
     <p:extLst>
       <p:ext uri="{BB962C8B-B14F-4D97-AF65-F5344CB8AC3E}">
-        <p14:creationId xmlns:p14="http://schemas.microsoft.com/office/powerpoint/2010/main" val="708072639"/>
+        <p14:creationId xmlns:p14="http://schemas.microsoft.com/office/powerpoint/2010/main" val="586132964"/>
       </p:ext>
     </p:extLst>
   </p:cSld>
@@ -549,13 +945,7 @@
       </p:grpSpPr>
       <p:sp>
         <p:nvSpPr>
-          <p:cNvPr id="2" name="Vertical Title 1">
-            <a:extLst>
-              <a:ext uri="{FF2B5EF4-FFF2-40B4-BE49-F238E27FC236}">
-                <a16:creationId xmlns:a16="http://schemas.microsoft.com/office/drawing/2014/main" id="{402C3D5F-FB54-644E-96E6-93D84A8996BB}"/>
-              </a:ext>
-            </a:extLst>
-          </p:cNvPr>
+          <p:cNvPr id="2" name="Vertical Title 1"/>
           <p:cNvSpPr>
             <a:spLocks noGrp="1"/>
           </p:cNvSpPr>
@@ -565,8 +955,8 @@
         </p:nvSpPr>
         <p:spPr>
           <a:xfrm>
-            <a:off x="8724900" y="365125"/>
-            <a:ext cx="2628900" cy="5811838"/>
+            <a:off x="8724900" y="304778"/>
+            <a:ext cx="2628900" cy="4851270"/>
           </a:xfrm>
         </p:spPr>
         <p:txBody>
@@ -577,19 +967,13 @@
               <a:rPr lang="en-GB"/>
               <a:t>Click to edit Master title style</a:t>
             </a:r>
-            <a:endParaRPr lang="en-US"/>
-          </a:p>
-        </p:txBody>
-      </p:sp>
-      <p:sp>
-        <p:nvSpPr>
-          <p:cNvPr id="3" name="Vertical Text Placeholder 2">
-            <a:extLst>
-              <a:ext uri="{FF2B5EF4-FFF2-40B4-BE49-F238E27FC236}">
-                <a16:creationId xmlns:a16="http://schemas.microsoft.com/office/drawing/2014/main" id="{6F258F18-CEF5-1747-A0DE-2D401A9D719E}"/>
-              </a:ext>
-            </a:extLst>
-          </p:cNvPr>
+            <a:endParaRPr lang="en-US" dirty="0"/>
+          </a:p>
+        </p:txBody>
+      </p:sp>
+      <p:sp>
+        <p:nvSpPr>
+          <p:cNvPr id="3" name="Vertical Text Placeholder 2"/>
           <p:cNvSpPr>
             <a:spLocks noGrp="1"/>
           </p:cNvSpPr>
@@ -599,8 +983,8 @@
         </p:nvSpPr>
         <p:spPr>
           <a:xfrm>
-            <a:off x="838200" y="365125"/>
-            <a:ext cx="7734300" cy="5811838"/>
+            <a:off x="838200" y="304778"/>
+            <a:ext cx="7734300" cy="4851270"/>
           </a:xfrm>
         </p:spPr>
         <p:txBody>
@@ -640,19 +1024,13 @@
               <a:rPr lang="en-GB"/>
               <a:t>Fifth level</a:t>
             </a:r>
-            <a:endParaRPr lang="en-US"/>
-          </a:p>
-        </p:txBody>
-      </p:sp>
-      <p:sp>
-        <p:nvSpPr>
-          <p:cNvPr id="4" name="Date Placeholder 3">
-            <a:extLst>
-              <a:ext uri="{FF2B5EF4-FFF2-40B4-BE49-F238E27FC236}">
-                <a16:creationId xmlns:a16="http://schemas.microsoft.com/office/drawing/2014/main" id="{86D4EE47-4853-7340-8D1F-9C22401E7E19}"/>
-              </a:ext>
-            </a:extLst>
-          </p:cNvPr>
+            <a:endParaRPr lang="en-US" dirty="0"/>
+          </a:p>
+        </p:txBody>
+      </p:sp>
+      <p:sp>
+        <p:nvSpPr>
+          <p:cNvPr id="4" name="Date Placeholder 3"/>
           <p:cNvSpPr>
             <a:spLocks noGrp="1"/>
           </p:cNvSpPr>
@@ -675,13 +1053,7 @@
       </p:sp>
       <p:sp>
         <p:nvSpPr>
-          <p:cNvPr id="5" name="Footer Placeholder 4">
-            <a:extLst>
-              <a:ext uri="{FF2B5EF4-FFF2-40B4-BE49-F238E27FC236}">
-                <a16:creationId xmlns:a16="http://schemas.microsoft.com/office/drawing/2014/main" id="{94FBB1EB-FC2F-9F4A-8082-F41457EFA8AA}"/>
-              </a:ext>
-            </a:extLst>
-          </p:cNvPr>
+          <p:cNvPr id="5" name="Footer Placeholder 4"/>
           <p:cNvSpPr>
             <a:spLocks noGrp="1"/>
           </p:cNvSpPr>
@@ -700,13 +1072,7 @@
       </p:sp>
       <p:sp>
         <p:nvSpPr>
-          <p:cNvPr id="6" name="Slide Number Placeholder 5">
-            <a:extLst>
-              <a:ext uri="{FF2B5EF4-FFF2-40B4-BE49-F238E27FC236}">
-                <a16:creationId xmlns:a16="http://schemas.microsoft.com/office/drawing/2014/main" id="{1A7F2CC2-238B-D147-B295-8E0FA21989B3}"/>
-              </a:ext>
-            </a:extLst>
-          </p:cNvPr>
+          <p:cNvPr id="6" name="Slide Number Placeholder 5"/>
           <p:cNvSpPr>
             <a:spLocks noGrp="1"/>
           </p:cNvSpPr>
@@ -730,7 +1096,7 @@
     </p:spTree>
     <p:extLst>
       <p:ext uri="{BB962C8B-B14F-4D97-AF65-F5344CB8AC3E}">
-        <p14:creationId xmlns:p14="http://schemas.microsoft.com/office/powerpoint/2010/main" val="2253930017"/>
+        <p14:creationId xmlns:p14="http://schemas.microsoft.com/office/powerpoint/2010/main" val="164224036"/>
       </p:ext>
     </p:extLst>
   </p:cSld>
@@ -759,13 +1125,7 @@
       </p:grpSpPr>
       <p:sp>
         <p:nvSpPr>
-          <p:cNvPr id="2" name="Title 1">
-            <a:extLst>
-              <a:ext uri="{FF2B5EF4-FFF2-40B4-BE49-F238E27FC236}">
-                <a16:creationId xmlns:a16="http://schemas.microsoft.com/office/drawing/2014/main" id="{4143B7C2-5E74-3F4E-ACB8-9D837BE6F368}"/>
-              </a:ext>
-            </a:extLst>
-          </p:cNvPr>
+          <p:cNvPr id="2" name="Title 1"/>
           <p:cNvSpPr>
             <a:spLocks noGrp="1"/>
           </p:cNvSpPr>
@@ -782,19 +1142,13 @@
               <a:rPr lang="en-GB"/>
               <a:t>Click to edit Master title style</a:t>
             </a:r>
-            <a:endParaRPr lang="en-US"/>
-          </a:p>
-        </p:txBody>
-      </p:sp>
-      <p:sp>
-        <p:nvSpPr>
-          <p:cNvPr id="3" name="Content Placeholder 2">
-            <a:extLst>
-              <a:ext uri="{FF2B5EF4-FFF2-40B4-BE49-F238E27FC236}">
-                <a16:creationId xmlns:a16="http://schemas.microsoft.com/office/drawing/2014/main" id="{3783404B-F03D-324D-810B-0CD8F76CC7E6}"/>
-              </a:ext>
-            </a:extLst>
-          </p:cNvPr>
+            <a:endParaRPr lang="en-US" dirty="0"/>
+          </a:p>
+        </p:txBody>
+      </p:sp>
+      <p:sp>
+        <p:nvSpPr>
+          <p:cNvPr id="3" name="Content Placeholder 2"/>
           <p:cNvSpPr>
             <a:spLocks noGrp="1"/>
           </p:cNvSpPr>
@@ -840,19 +1194,13 @@
               <a:rPr lang="en-GB"/>
               <a:t>Fifth level</a:t>
             </a:r>
-            <a:endParaRPr lang="en-US"/>
-          </a:p>
-        </p:txBody>
-      </p:sp>
-      <p:sp>
-        <p:nvSpPr>
-          <p:cNvPr id="4" name="Date Placeholder 3">
-            <a:extLst>
-              <a:ext uri="{FF2B5EF4-FFF2-40B4-BE49-F238E27FC236}">
-                <a16:creationId xmlns:a16="http://schemas.microsoft.com/office/drawing/2014/main" id="{13307D1F-CD73-1840-B8C8-F7F30A0CCAA3}"/>
-              </a:ext>
-            </a:extLst>
-          </p:cNvPr>
+            <a:endParaRPr lang="en-US" dirty="0"/>
+          </a:p>
+        </p:txBody>
+      </p:sp>
+      <p:sp>
+        <p:nvSpPr>
+          <p:cNvPr id="4" name="Date Placeholder 3"/>
           <p:cNvSpPr>
             <a:spLocks noGrp="1"/>
           </p:cNvSpPr>
@@ -875,13 +1223,7 @@
       </p:sp>
       <p:sp>
         <p:nvSpPr>
-          <p:cNvPr id="5" name="Footer Placeholder 4">
-            <a:extLst>
-              <a:ext uri="{FF2B5EF4-FFF2-40B4-BE49-F238E27FC236}">
-                <a16:creationId xmlns:a16="http://schemas.microsoft.com/office/drawing/2014/main" id="{46650B80-6277-0F49-9FD9-86A11D022D9D}"/>
-              </a:ext>
-            </a:extLst>
-          </p:cNvPr>
+          <p:cNvPr id="5" name="Footer Placeholder 4"/>
           <p:cNvSpPr>
             <a:spLocks noGrp="1"/>
           </p:cNvSpPr>
@@ -900,13 +1242,7 @@
       </p:sp>
       <p:sp>
         <p:nvSpPr>
-          <p:cNvPr id="6" name="Slide Number Placeholder 5">
-            <a:extLst>
-              <a:ext uri="{FF2B5EF4-FFF2-40B4-BE49-F238E27FC236}">
-                <a16:creationId xmlns:a16="http://schemas.microsoft.com/office/drawing/2014/main" id="{1E330970-320F-D74B-8C8E-2CB3A26AD951}"/>
-              </a:ext>
-            </a:extLst>
-          </p:cNvPr>
+          <p:cNvPr id="6" name="Slide Number Placeholder 5"/>
           <p:cNvSpPr>
             <a:spLocks noGrp="1"/>
           </p:cNvSpPr>
@@ -930,7 +1266,7 @@
     </p:spTree>
     <p:extLst>
       <p:ext uri="{BB962C8B-B14F-4D97-AF65-F5344CB8AC3E}">
-        <p14:creationId xmlns:p14="http://schemas.microsoft.com/office/powerpoint/2010/main" val="1224085592"/>
+        <p14:creationId xmlns:p14="http://schemas.microsoft.com/office/powerpoint/2010/main" val="1174492252"/>
       </p:ext>
     </p:extLst>
   </p:cSld>
@@ -959,13 +1295,7 @@
       </p:grpSpPr>
       <p:sp>
         <p:nvSpPr>
-          <p:cNvPr id="2" name="Title 1">
-            <a:extLst>
-              <a:ext uri="{FF2B5EF4-FFF2-40B4-BE49-F238E27FC236}">
-                <a16:creationId xmlns:a16="http://schemas.microsoft.com/office/drawing/2014/main" id="{4DE8862D-58B2-6B46-BEAE-7FD21E59D468}"/>
-              </a:ext>
-            </a:extLst>
-          </p:cNvPr>
+          <p:cNvPr id="2" name="Title 1"/>
           <p:cNvSpPr>
             <a:spLocks noGrp="1"/>
           </p:cNvSpPr>
@@ -975,15 +1305,15 @@
         </p:nvSpPr>
         <p:spPr>
           <a:xfrm>
-            <a:off x="831850" y="1709738"/>
-            <a:ext cx="10515600" cy="2852737"/>
+            <a:off x="831850" y="1427157"/>
+            <a:ext cx="10515600" cy="2381243"/>
           </a:xfrm>
         </p:spPr>
         <p:txBody>
           <a:bodyPr anchor="b"/>
           <a:lstStyle>
             <a:lvl1pPr>
-              <a:defRPr sz="6000"/>
+              <a:defRPr sz="5008"/>
             </a:lvl1pPr>
           </a:lstStyle>
           <a:p>
@@ -991,19 +1321,13 @@
               <a:rPr lang="en-GB"/>
               <a:t>Click to edit Master title style</a:t>
             </a:r>
-            <a:endParaRPr lang="en-US"/>
-          </a:p>
-        </p:txBody>
-      </p:sp>
-      <p:sp>
-        <p:nvSpPr>
-          <p:cNvPr id="3" name="Text Placeholder 2">
-            <a:extLst>
-              <a:ext uri="{FF2B5EF4-FFF2-40B4-BE49-F238E27FC236}">
-                <a16:creationId xmlns:a16="http://schemas.microsoft.com/office/drawing/2014/main" id="{0491EC6B-9488-1C4C-AF2C-CFA7A89AD902}"/>
-              </a:ext>
-            </a:extLst>
-          </p:cNvPr>
+            <a:endParaRPr lang="en-US" dirty="0"/>
+          </a:p>
+        </p:txBody>
+      </p:sp>
+      <p:sp>
+        <p:nvSpPr>
+          <p:cNvPr id="3" name="Text Placeholder 2"/>
           <p:cNvSpPr>
             <a:spLocks noGrp="1"/>
           </p:cNvSpPr>
@@ -1013,8 +1337,8 @@
         </p:nvSpPr>
         <p:spPr>
           <a:xfrm>
-            <a:off x="831850" y="4589463"/>
-            <a:ext cx="10515600" cy="1500187"/>
+            <a:off x="831850" y="3830927"/>
+            <a:ext cx="10515600" cy="1252239"/>
           </a:xfrm>
         </p:spPr>
         <p:txBody>
@@ -1022,7 +1346,7 @@
           <a:lstStyle>
             <a:lvl1pPr marL="0" indent="0">
               <a:buNone/>
-              <a:defRPr sz="2400">
+              <a:defRPr sz="2003">
                 <a:solidFill>
                   <a:schemeClr val="tx1">
                     <a:tint val="75000"/>
@@ -1030,9 +1354,9 @@
                 </a:solidFill>
               </a:defRPr>
             </a:lvl1pPr>
-            <a:lvl2pPr marL="457200" indent="0">
-              <a:buNone/>
-              <a:defRPr sz="2000">
+            <a:lvl2pPr marL="381625" indent="0">
+              <a:buNone/>
+              <a:defRPr sz="1669">
                 <a:solidFill>
                   <a:schemeClr val="tx1">
                     <a:tint val="75000"/>
@@ -1040,9 +1364,9 @@
                 </a:solidFill>
               </a:defRPr>
             </a:lvl2pPr>
-            <a:lvl3pPr marL="914400" indent="0">
-              <a:buNone/>
-              <a:defRPr sz="1800">
+            <a:lvl3pPr marL="763250" indent="0">
+              <a:buNone/>
+              <a:defRPr sz="1502">
                 <a:solidFill>
                   <a:schemeClr val="tx1">
                     <a:tint val="75000"/>
@@ -1050,9 +1374,9 @@
                 </a:solidFill>
               </a:defRPr>
             </a:lvl3pPr>
-            <a:lvl4pPr marL="1371600" indent="0">
-              <a:buNone/>
-              <a:defRPr sz="1600">
+            <a:lvl4pPr marL="1144875" indent="0">
+              <a:buNone/>
+              <a:defRPr sz="1336">
                 <a:solidFill>
                   <a:schemeClr val="tx1">
                     <a:tint val="75000"/>
@@ -1060,9 +1384,9 @@
                 </a:solidFill>
               </a:defRPr>
             </a:lvl4pPr>
-            <a:lvl5pPr marL="1828800" indent="0">
-              <a:buNone/>
-              <a:defRPr sz="1600">
+            <a:lvl5pPr marL="1526499" indent="0">
+              <a:buNone/>
+              <a:defRPr sz="1336">
                 <a:solidFill>
                   <a:schemeClr val="tx1">
                     <a:tint val="75000"/>
@@ -1070,9 +1394,9 @@
                 </a:solidFill>
               </a:defRPr>
             </a:lvl5pPr>
-            <a:lvl6pPr marL="2286000" indent="0">
-              <a:buNone/>
-              <a:defRPr sz="1600">
+            <a:lvl6pPr marL="1908124" indent="0">
+              <a:buNone/>
+              <a:defRPr sz="1336">
                 <a:solidFill>
                   <a:schemeClr val="tx1">
                     <a:tint val="75000"/>
@@ -1080,9 +1404,9 @@
                 </a:solidFill>
               </a:defRPr>
             </a:lvl6pPr>
-            <a:lvl7pPr marL="2743200" indent="0">
-              <a:buNone/>
-              <a:defRPr sz="1600">
+            <a:lvl7pPr marL="2289749" indent="0">
+              <a:buNone/>
+              <a:defRPr sz="1336">
                 <a:solidFill>
                   <a:schemeClr val="tx1">
                     <a:tint val="75000"/>
@@ -1090,9 +1414,9 @@
                 </a:solidFill>
               </a:defRPr>
             </a:lvl7pPr>
-            <a:lvl8pPr marL="3200400" indent="0">
-              <a:buNone/>
-              <a:defRPr sz="1600">
+            <a:lvl8pPr marL="2671374" indent="0">
+              <a:buNone/>
+              <a:defRPr sz="1336">
                 <a:solidFill>
                   <a:schemeClr val="tx1">
                     <a:tint val="75000"/>
@@ -1100,9 +1424,9 @@
                 </a:solidFill>
               </a:defRPr>
             </a:lvl8pPr>
-            <a:lvl9pPr marL="3657600" indent="0">
-              <a:buNone/>
-              <a:defRPr sz="1600">
+            <a:lvl9pPr marL="3052999" indent="0">
+              <a:buNone/>
+              <a:defRPr sz="1336">
                 <a:solidFill>
                   <a:schemeClr val="tx1">
                     <a:tint val="75000"/>
@@ -1122,13 +1446,7 @@
       </p:sp>
       <p:sp>
         <p:nvSpPr>
-          <p:cNvPr id="4" name="Date Placeholder 3">
-            <a:extLst>
-              <a:ext uri="{FF2B5EF4-FFF2-40B4-BE49-F238E27FC236}">
-                <a16:creationId xmlns:a16="http://schemas.microsoft.com/office/drawing/2014/main" id="{9E646630-C403-7843-9D00-3FB25C11618B}"/>
-              </a:ext>
-            </a:extLst>
-          </p:cNvPr>
+          <p:cNvPr id="4" name="Date Placeholder 3"/>
           <p:cNvSpPr>
             <a:spLocks noGrp="1"/>
           </p:cNvSpPr>
@@ -1151,13 +1469,7 @@
       </p:sp>
       <p:sp>
         <p:nvSpPr>
-          <p:cNvPr id="5" name="Footer Placeholder 4">
-            <a:extLst>
-              <a:ext uri="{FF2B5EF4-FFF2-40B4-BE49-F238E27FC236}">
-                <a16:creationId xmlns:a16="http://schemas.microsoft.com/office/drawing/2014/main" id="{9B65F4C8-B612-B542-8075-6667AF35EE92}"/>
-              </a:ext>
-            </a:extLst>
-          </p:cNvPr>
+          <p:cNvPr id="5" name="Footer Placeholder 4"/>
           <p:cNvSpPr>
             <a:spLocks noGrp="1"/>
           </p:cNvSpPr>
@@ -1176,13 +1488,7 @@
       </p:sp>
       <p:sp>
         <p:nvSpPr>
-          <p:cNvPr id="6" name="Slide Number Placeholder 5">
-            <a:extLst>
-              <a:ext uri="{FF2B5EF4-FFF2-40B4-BE49-F238E27FC236}">
-                <a16:creationId xmlns:a16="http://schemas.microsoft.com/office/drawing/2014/main" id="{9FC19FAA-453A-734D-897E-0AD5353042CC}"/>
-              </a:ext>
-            </a:extLst>
-          </p:cNvPr>
+          <p:cNvPr id="6" name="Slide Number Placeholder 5"/>
           <p:cNvSpPr>
             <a:spLocks noGrp="1"/>
           </p:cNvSpPr>
@@ -1206,7 +1512,7 @@
     </p:spTree>
     <p:extLst>
       <p:ext uri="{BB962C8B-B14F-4D97-AF65-F5344CB8AC3E}">
-        <p14:creationId xmlns:p14="http://schemas.microsoft.com/office/powerpoint/2010/main" val="1533022137"/>
+        <p14:creationId xmlns:p14="http://schemas.microsoft.com/office/powerpoint/2010/main" val="213850992"/>
       </p:ext>
     </p:extLst>
   </p:cSld>
@@ -1235,13 +1541,7 @@
       </p:grpSpPr>
       <p:sp>
         <p:nvSpPr>
-          <p:cNvPr id="2" name="Title 1">
-            <a:extLst>
-              <a:ext uri="{FF2B5EF4-FFF2-40B4-BE49-F238E27FC236}">
-                <a16:creationId xmlns:a16="http://schemas.microsoft.com/office/drawing/2014/main" id="{B7C659B8-8313-BA4B-93D8-E6EF9D40E821}"/>
-              </a:ext>
-            </a:extLst>
-          </p:cNvPr>
+          <p:cNvPr id="2" name="Title 1"/>
           <p:cNvSpPr>
             <a:spLocks noGrp="1"/>
           </p:cNvSpPr>
@@ -1258,19 +1558,13 @@
               <a:rPr lang="en-GB"/>
               <a:t>Click to edit Master title style</a:t>
             </a:r>
-            <a:endParaRPr lang="en-US"/>
-          </a:p>
-        </p:txBody>
-      </p:sp>
-      <p:sp>
-        <p:nvSpPr>
-          <p:cNvPr id="3" name="Content Placeholder 2">
-            <a:extLst>
-              <a:ext uri="{FF2B5EF4-FFF2-40B4-BE49-F238E27FC236}">
-                <a16:creationId xmlns:a16="http://schemas.microsoft.com/office/drawing/2014/main" id="{98646BF8-C1A6-2E4E-B7C1-DC3D8A185CFD}"/>
-              </a:ext>
-            </a:extLst>
-          </p:cNvPr>
+            <a:endParaRPr lang="en-US" dirty="0"/>
+          </a:p>
+        </p:txBody>
+      </p:sp>
+      <p:sp>
+        <p:nvSpPr>
+          <p:cNvPr id="3" name="Content Placeholder 2"/>
           <p:cNvSpPr>
             <a:spLocks noGrp="1"/>
           </p:cNvSpPr>
@@ -1280,8 +1574,8 @@
         </p:nvSpPr>
         <p:spPr>
           <a:xfrm>
-            <a:off x="838200" y="1825625"/>
-            <a:ext cx="5181600" cy="4351338"/>
+            <a:off x="838200" y="1523890"/>
+            <a:ext cx="5181600" cy="3632159"/>
           </a:xfrm>
         </p:spPr>
         <p:txBody>
@@ -1321,19 +1615,13 @@
               <a:rPr lang="en-GB"/>
               <a:t>Fifth level</a:t>
             </a:r>
-            <a:endParaRPr lang="en-US"/>
-          </a:p>
-        </p:txBody>
-      </p:sp>
-      <p:sp>
-        <p:nvSpPr>
-          <p:cNvPr id="4" name="Content Placeholder 3">
-            <a:extLst>
-              <a:ext uri="{FF2B5EF4-FFF2-40B4-BE49-F238E27FC236}">
-                <a16:creationId xmlns:a16="http://schemas.microsoft.com/office/drawing/2014/main" id="{69708C24-79A7-FF41-BC61-29319F25FA8E}"/>
-              </a:ext>
-            </a:extLst>
-          </p:cNvPr>
+            <a:endParaRPr lang="en-US" dirty="0"/>
+          </a:p>
+        </p:txBody>
+      </p:sp>
+      <p:sp>
+        <p:nvSpPr>
+          <p:cNvPr id="4" name="Content Placeholder 3"/>
           <p:cNvSpPr>
             <a:spLocks noGrp="1"/>
           </p:cNvSpPr>
@@ -1343,8 +1631,8 @@
         </p:nvSpPr>
         <p:spPr>
           <a:xfrm>
-            <a:off x="6172200" y="1825625"/>
-            <a:ext cx="5181600" cy="4351338"/>
+            <a:off x="6172200" y="1523890"/>
+            <a:ext cx="5181600" cy="3632159"/>
           </a:xfrm>
         </p:spPr>
         <p:txBody>
@@ -1384,19 +1672,13 @@
               <a:rPr lang="en-GB"/>
               <a:t>Fifth level</a:t>
             </a:r>
-            <a:endParaRPr lang="en-US"/>
-          </a:p>
-        </p:txBody>
-      </p:sp>
-      <p:sp>
-        <p:nvSpPr>
-          <p:cNvPr id="5" name="Date Placeholder 4">
-            <a:extLst>
-              <a:ext uri="{FF2B5EF4-FFF2-40B4-BE49-F238E27FC236}">
-                <a16:creationId xmlns:a16="http://schemas.microsoft.com/office/drawing/2014/main" id="{D88715BE-B26B-1146-800C-5C6CCD434383}"/>
-              </a:ext>
-            </a:extLst>
-          </p:cNvPr>
+            <a:endParaRPr lang="en-US" dirty="0"/>
+          </a:p>
+        </p:txBody>
+      </p:sp>
+      <p:sp>
+        <p:nvSpPr>
+          <p:cNvPr id="5" name="Date Placeholder 4"/>
           <p:cNvSpPr>
             <a:spLocks noGrp="1"/>
           </p:cNvSpPr>
@@ -1419,13 +1701,7 @@
       </p:sp>
       <p:sp>
         <p:nvSpPr>
-          <p:cNvPr id="6" name="Footer Placeholder 5">
-            <a:extLst>
-              <a:ext uri="{FF2B5EF4-FFF2-40B4-BE49-F238E27FC236}">
-                <a16:creationId xmlns:a16="http://schemas.microsoft.com/office/drawing/2014/main" id="{46682A04-DCE0-BE4A-BFD0-D51A5B4DB86E}"/>
-              </a:ext>
-            </a:extLst>
-          </p:cNvPr>
+          <p:cNvPr id="6" name="Footer Placeholder 5"/>
           <p:cNvSpPr>
             <a:spLocks noGrp="1"/>
           </p:cNvSpPr>
@@ -1444,13 +1720,7 @@
       </p:sp>
       <p:sp>
         <p:nvSpPr>
-          <p:cNvPr id="7" name="Slide Number Placeholder 6">
-            <a:extLst>
-              <a:ext uri="{FF2B5EF4-FFF2-40B4-BE49-F238E27FC236}">
-                <a16:creationId xmlns:a16="http://schemas.microsoft.com/office/drawing/2014/main" id="{A4643637-2DEB-EA4E-A8D7-D1C90C77AB6A}"/>
-              </a:ext>
-            </a:extLst>
-          </p:cNvPr>
+          <p:cNvPr id="7" name="Slide Number Placeholder 6"/>
           <p:cNvSpPr>
             <a:spLocks noGrp="1"/>
           </p:cNvSpPr>
@@ -1474,7 +1744,7 @@
     </p:spTree>
     <p:extLst>
       <p:ext uri="{BB962C8B-B14F-4D97-AF65-F5344CB8AC3E}">
-        <p14:creationId xmlns:p14="http://schemas.microsoft.com/office/powerpoint/2010/main" val="2215996348"/>
+        <p14:creationId xmlns:p14="http://schemas.microsoft.com/office/powerpoint/2010/main" val="994275410"/>
       </p:ext>
     </p:extLst>
   </p:cSld>
@@ -1503,13 +1773,7 @@
       </p:grpSpPr>
       <p:sp>
         <p:nvSpPr>
-          <p:cNvPr id="2" name="Title 1">
-            <a:extLst>
-              <a:ext uri="{FF2B5EF4-FFF2-40B4-BE49-F238E27FC236}">
-                <a16:creationId xmlns:a16="http://schemas.microsoft.com/office/drawing/2014/main" id="{DC0D1309-A78B-7A42-98A8-6DBD33EAF79F}"/>
-              </a:ext>
-            </a:extLst>
-          </p:cNvPr>
+          <p:cNvPr id="2" name="Title 1"/>
           <p:cNvSpPr>
             <a:spLocks noGrp="1"/>
           </p:cNvSpPr>
@@ -1519,8 +1783,8 @@
         </p:nvSpPr>
         <p:spPr>
           <a:xfrm>
-            <a:off x="839788" y="365125"/>
-            <a:ext cx="10515600" cy="1325563"/>
+            <a:off x="839788" y="304778"/>
+            <a:ext cx="10515600" cy="1106477"/>
           </a:xfrm>
         </p:spPr>
         <p:txBody>
@@ -1531,19 +1795,13 @@
               <a:rPr lang="en-GB"/>
               <a:t>Click to edit Master title style</a:t>
             </a:r>
-            <a:endParaRPr lang="en-US"/>
-          </a:p>
-        </p:txBody>
-      </p:sp>
-      <p:sp>
-        <p:nvSpPr>
-          <p:cNvPr id="3" name="Text Placeholder 2">
-            <a:extLst>
-              <a:ext uri="{FF2B5EF4-FFF2-40B4-BE49-F238E27FC236}">
-                <a16:creationId xmlns:a16="http://schemas.microsoft.com/office/drawing/2014/main" id="{DE480805-04F7-0442-9237-4FCEB8A7C06D}"/>
-              </a:ext>
-            </a:extLst>
-          </p:cNvPr>
+            <a:endParaRPr lang="en-US" dirty="0"/>
+          </a:p>
+        </p:txBody>
+      </p:sp>
+      <p:sp>
+        <p:nvSpPr>
+          <p:cNvPr id="3" name="Text Placeholder 2"/>
           <p:cNvSpPr>
             <a:spLocks noGrp="1"/>
           </p:cNvSpPr>
@@ -1553,8 +1811,8 @@
         </p:nvSpPr>
         <p:spPr>
           <a:xfrm>
-            <a:off x="839788" y="1681163"/>
-            <a:ext cx="5157787" cy="823912"/>
+            <a:off x="839789" y="1403304"/>
+            <a:ext cx="5157787" cy="687738"/>
           </a:xfrm>
         </p:spPr>
         <p:txBody>
@@ -1562,39 +1820,39 @@
           <a:lstStyle>
             <a:lvl1pPr marL="0" indent="0">
               <a:buNone/>
-              <a:defRPr sz="2400" b="1"/>
+              <a:defRPr sz="2003" b="1"/>
             </a:lvl1pPr>
-            <a:lvl2pPr marL="457200" indent="0">
-              <a:buNone/>
-              <a:defRPr sz="2000" b="1"/>
+            <a:lvl2pPr marL="381625" indent="0">
+              <a:buNone/>
+              <a:defRPr sz="1669" b="1"/>
             </a:lvl2pPr>
-            <a:lvl3pPr marL="914400" indent="0">
-              <a:buNone/>
-              <a:defRPr sz="1800" b="1"/>
+            <a:lvl3pPr marL="763250" indent="0">
+              <a:buNone/>
+              <a:defRPr sz="1502" b="1"/>
             </a:lvl3pPr>
-            <a:lvl4pPr marL="1371600" indent="0">
-              <a:buNone/>
-              <a:defRPr sz="1600" b="1"/>
+            <a:lvl4pPr marL="1144875" indent="0">
+              <a:buNone/>
+              <a:defRPr sz="1336" b="1"/>
             </a:lvl4pPr>
-            <a:lvl5pPr marL="1828800" indent="0">
-              <a:buNone/>
-              <a:defRPr sz="1600" b="1"/>
+            <a:lvl5pPr marL="1526499" indent="0">
+              <a:buNone/>
+              <a:defRPr sz="1336" b="1"/>
             </a:lvl5pPr>
-            <a:lvl6pPr marL="2286000" indent="0">
-              <a:buNone/>
-              <a:defRPr sz="1600" b="1"/>
+            <a:lvl6pPr marL="1908124" indent="0">
+              <a:buNone/>
+              <a:defRPr sz="1336" b="1"/>
             </a:lvl6pPr>
-            <a:lvl7pPr marL="2743200" indent="0">
-              <a:buNone/>
-              <a:defRPr sz="1600" b="1"/>
+            <a:lvl7pPr marL="2289749" indent="0">
+              <a:buNone/>
+              <a:defRPr sz="1336" b="1"/>
             </a:lvl7pPr>
-            <a:lvl8pPr marL="3200400" indent="0">
-              <a:buNone/>
-              <a:defRPr sz="1600" b="1"/>
+            <a:lvl8pPr marL="2671374" indent="0">
+              <a:buNone/>
+              <a:defRPr sz="1336" b="1"/>
             </a:lvl8pPr>
-            <a:lvl9pPr marL="3657600" indent="0">
-              <a:buNone/>
-              <a:defRPr sz="1600" b="1"/>
+            <a:lvl9pPr marL="3052999" indent="0">
+              <a:buNone/>
+              <a:defRPr sz="1336" b="1"/>
             </a:lvl9pPr>
           </a:lstStyle>
           <a:p>
@@ -1608,13 +1866,7 @@
       </p:sp>
       <p:sp>
         <p:nvSpPr>
-          <p:cNvPr id="4" name="Content Placeholder 3">
-            <a:extLst>
-              <a:ext uri="{FF2B5EF4-FFF2-40B4-BE49-F238E27FC236}">
-                <a16:creationId xmlns:a16="http://schemas.microsoft.com/office/drawing/2014/main" id="{A013395A-0EAB-F647-B3FF-8975B3760347}"/>
-              </a:ext>
-            </a:extLst>
-          </p:cNvPr>
+          <p:cNvPr id="4" name="Content Placeholder 3"/>
           <p:cNvSpPr>
             <a:spLocks noGrp="1"/>
           </p:cNvSpPr>
@@ -1624,8 +1876,8 @@
         </p:nvSpPr>
         <p:spPr>
           <a:xfrm>
-            <a:off x="839788" y="2505075"/>
-            <a:ext cx="5157787" cy="3684588"/>
+            <a:off x="839789" y="2091042"/>
+            <a:ext cx="5157787" cy="3075607"/>
           </a:xfrm>
         </p:spPr>
         <p:txBody>
@@ -1665,19 +1917,13 @@
               <a:rPr lang="en-GB"/>
               <a:t>Fifth level</a:t>
             </a:r>
-            <a:endParaRPr lang="en-US"/>
-          </a:p>
-        </p:txBody>
-      </p:sp>
-      <p:sp>
-        <p:nvSpPr>
-          <p:cNvPr id="5" name="Text Placeholder 4">
-            <a:extLst>
-              <a:ext uri="{FF2B5EF4-FFF2-40B4-BE49-F238E27FC236}">
-                <a16:creationId xmlns:a16="http://schemas.microsoft.com/office/drawing/2014/main" id="{2AA86D0F-E232-DE44-A413-F24BDD85F53F}"/>
-              </a:ext>
-            </a:extLst>
-          </p:cNvPr>
+            <a:endParaRPr lang="en-US" dirty="0"/>
+          </a:p>
+        </p:txBody>
+      </p:sp>
+      <p:sp>
+        <p:nvSpPr>
+          <p:cNvPr id="5" name="Text Placeholder 4"/>
           <p:cNvSpPr>
             <a:spLocks noGrp="1"/>
           </p:cNvSpPr>
@@ -1687,8 +1933,8 @@
         </p:nvSpPr>
         <p:spPr>
           <a:xfrm>
-            <a:off x="6172200" y="1681163"/>
-            <a:ext cx="5183188" cy="823912"/>
+            <a:off x="6172200" y="1403304"/>
+            <a:ext cx="5183188" cy="687738"/>
           </a:xfrm>
         </p:spPr>
         <p:txBody>
@@ -1696,39 +1942,39 @@
           <a:lstStyle>
             <a:lvl1pPr marL="0" indent="0">
               <a:buNone/>
-              <a:defRPr sz="2400" b="1"/>
+              <a:defRPr sz="2003" b="1"/>
             </a:lvl1pPr>
-            <a:lvl2pPr marL="457200" indent="0">
-              <a:buNone/>
-              <a:defRPr sz="2000" b="1"/>
+            <a:lvl2pPr marL="381625" indent="0">
+              <a:buNone/>
+              <a:defRPr sz="1669" b="1"/>
             </a:lvl2pPr>
-            <a:lvl3pPr marL="914400" indent="0">
-              <a:buNone/>
-              <a:defRPr sz="1800" b="1"/>
+            <a:lvl3pPr marL="763250" indent="0">
+              <a:buNone/>
+              <a:defRPr sz="1502" b="1"/>
             </a:lvl3pPr>
-            <a:lvl4pPr marL="1371600" indent="0">
-              <a:buNone/>
-              <a:defRPr sz="1600" b="1"/>
+            <a:lvl4pPr marL="1144875" indent="0">
+              <a:buNone/>
+              <a:defRPr sz="1336" b="1"/>
             </a:lvl4pPr>
-            <a:lvl5pPr marL="1828800" indent="0">
-              <a:buNone/>
-              <a:defRPr sz="1600" b="1"/>
+            <a:lvl5pPr marL="1526499" indent="0">
+              <a:buNone/>
+              <a:defRPr sz="1336" b="1"/>
             </a:lvl5pPr>
-            <a:lvl6pPr marL="2286000" indent="0">
-              <a:buNone/>
-              <a:defRPr sz="1600" b="1"/>
+            <a:lvl6pPr marL="1908124" indent="0">
+              <a:buNone/>
+              <a:defRPr sz="1336" b="1"/>
             </a:lvl6pPr>
-            <a:lvl7pPr marL="2743200" indent="0">
-              <a:buNone/>
-              <a:defRPr sz="1600" b="1"/>
+            <a:lvl7pPr marL="2289749" indent="0">
+              <a:buNone/>
+              <a:defRPr sz="1336" b="1"/>
             </a:lvl7pPr>
-            <a:lvl8pPr marL="3200400" indent="0">
-              <a:buNone/>
-              <a:defRPr sz="1600" b="1"/>
+            <a:lvl8pPr marL="2671374" indent="0">
+              <a:buNone/>
+              <a:defRPr sz="1336" b="1"/>
             </a:lvl8pPr>
-            <a:lvl9pPr marL="3657600" indent="0">
-              <a:buNone/>
-              <a:defRPr sz="1600" b="1"/>
+            <a:lvl9pPr marL="3052999" indent="0">
+              <a:buNone/>
+              <a:defRPr sz="1336" b="1"/>
             </a:lvl9pPr>
           </a:lstStyle>
           <a:p>
@@ -1742,13 +1988,7 @@
       </p:sp>
       <p:sp>
         <p:nvSpPr>
-          <p:cNvPr id="6" name="Content Placeholder 5">
-            <a:extLst>
-              <a:ext uri="{FF2B5EF4-FFF2-40B4-BE49-F238E27FC236}">
-                <a16:creationId xmlns:a16="http://schemas.microsoft.com/office/drawing/2014/main" id="{54ADCA05-359E-A348-B18C-BC33E49B89B2}"/>
-              </a:ext>
-            </a:extLst>
-          </p:cNvPr>
+          <p:cNvPr id="6" name="Content Placeholder 5"/>
           <p:cNvSpPr>
             <a:spLocks noGrp="1"/>
           </p:cNvSpPr>
@@ -1758,8 +1998,8 @@
         </p:nvSpPr>
         <p:spPr>
           <a:xfrm>
-            <a:off x="6172200" y="2505075"/>
-            <a:ext cx="5183188" cy="3684588"/>
+            <a:off x="6172200" y="2091042"/>
+            <a:ext cx="5183188" cy="3075607"/>
           </a:xfrm>
         </p:spPr>
         <p:txBody>
@@ -1799,19 +2039,13 @@
               <a:rPr lang="en-GB"/>
               <a:t>Fifth level</a:t>
             </a:r>
-            <a:endParaRPr lang="en-US"/>
-          </a:p>
-        </p:txBody>
-      </p:sp>
-      <p:sp>
-        <p:nvSpPr>
-          <p:cNvPr id="7" name="Date Placeholder 6">
-            <a:extLst>
-              <a:ext uri="{FF2B5EF4-FFF2-40B4-BE49-F238E27FC236}">
-                <a16:creationId xmlns:a16="http://schemas.microsoft.com/office/drawing/2014/main" id="{B2C38684-89C5-FB47-A833-2FB850DA7495}"/>
-              </a:ext>
-            </a:extLst>
-          </p:cNvPr>
+            <a:endParaRPr lang="en-US" dirty="0"/>
+          </a:p>
+        </p:txBody>
+      </p:sp>
+      <p:sp>
+        <p:nvSpPr>
+          <p:cNvPr id="7" name="Date Placeholder 6"/>
           <p:cNvSpPr>
             <a:spLocks noGrp="1"/>
           </p:cNvSpPr>
@@ -1834,13 +2068,7 @@
       </p:sp>
       <p:sp>
         <p:nvSpPr>
-          <p:cNvPr id="8" name="Footer Placeholder 7">
-            <a:extLst>
-              <a:ext uri="{FF2B5EF4-FFF2-40B4-BE49-F238E27FC236}">
-                <a16:creationId xmlns:a16="http://schemas.microsoft.com/office/drawing/2014/main" id="{D3916832-9041-A24D-8703-F2C13045A05E}"/>
-              </a:ext>
-            </a:extLst>
-          </p:cNvPr>
+          <p:cNvPr id="8" name="Footer Placeholder 7"/>
           <p:cNvSpPr>
             <a:spLocks noGrp="1"/>
           </p:cNvSpPr>
@@ -1859,13 +2087,7 @@
       </p:sp>
       <p:sp>
         <p:nvSpPr>
-          <p:cNvPr id="9" name="Slide Number Placeholder 8">
-            <a:extLst>
-              <a:ext uri="{FF2B5EF4-FFF2-40B4-BE49-F238E27FC236}">
-                <a16:creationId xmlns:a16="http://schemas.microsoft.com/office/drawing/2014/main" id="{91650D58-069D-5840-9B7B-D4146F64FDBB}"/>
-              </a:ext>
-            </a:extLst>
-          </p:cNvPr>
+          <p:cNvPr id="9" name="Slide Number Placeholder 8"/>
           <p:cNvSpPr>
             <a:spLocks noGrp="1"/>
           </p:cNvSpPr>
@@ -1889,7 +2111,7 @@
     </p:spTree>
     <p:extLst>
       <p:ext uri="{BB962C8B-B14F-4D97-AF65-F5344CB8AC3E}">
-        <p14:creationId xmlns:p14="http://schemas.microsoft.com/office/powerpoint/2010/main" val="1712117615"/>
+        <p14:creationId xmlns:p14="http://schemas.microsoft.com/office/powerpoint/2010/main" val="3825083221"/>
       </p:ext>
     </p:extLst>
   </p:cSld>
@@ -1918,13 +2140,7 @@
       </p:grpSpPr>
       <p:sp>
         <p:nvSpPr>
-          <p:cNvPr id="2" name="Title 1">
-            <a:extLst>
-              <a:ext uri="{FF2B5EF4-FFF2-40B4-BE49-F238E27FC236}">
-                <a16:creationId xmlns:a16="http://schemas.microsoft.com/office/drawing/2014/main" id="{CA83156A-1598-304C-A5F8-21775DD8C845}"/>
-              </a:ext>
-            </a:extLst>
-          </p:cNvPr>
+          <p:cNvPr id="2" name="Title 1"/>
           <p:cNvSpPr>
             <a:spLocks noGrp="1"/>
           </p:cNvSpPr>
@@ -1941,19 +2157,13 @@
               <a:rPr lang="en-GB"/>
               <a:t>Click to edit Master title style</a:t>
             </a:r>
-            <a:endParaRPr lang="en-US"/>
-          </a:p>
-        </p:txBody>
-      </p:sp>
-      <p:sp>
-        <p:nvSpPr>
-          <p:cNvPr id="3" name="Date Placeholder 2">
-            <a:extLst>
-              <a:ext uri="{FF2B5EF4-FFF2-40B4-BE49-F238E27FC236}">
-                <a16:creationId xmlns:a16="http://schemas.microsoft.com/office/drawing/2014/main" id="{7C79E686-F649-754D-BBD1-D6D0A378D271}"/>
-              </a:ext>
-            </a:extLst>
-          </p:cNvPr>
+            <a:endParaRPr lang="en-US" dirty="0"/>
+          </a:p>
+        </p:txBody>
+      </p:sp>
+      <p:sp>
+        <p:nvSpPr>
+          <p:cNvPr id="3" name="Date Placeholder 2"/>
           <p:cNvSpPr>
             <a:spLocks noGrp="1"/>
           </p:cNvSpPr>
@@ -1976,13 +2186,7 @@
       </p:sp>
       <p:sp>
         <p:nvSpPr>
-          <p:cNvPr id="4" name="Footer Placeholder 3">
-            <a:extLst>
-              <a:ext uri="{FF2B5EF4-FFF2-40B4-BE49-F238E27FC236}">
-                <a16:creationId xmlns:a16="http://schemas.microsoft.com/office/drawing/2014/main" id="{F78F7C44-2483-3941-8A1F-481C6CED5389}"/>
-              </a:ext>
-            </a:extLst>
-          </p:cNvPr>
+          <p:cNvPr id="4" name="Footer Placeholder 3"/>
           <p:cNvSpPr>
             <a:spLocks noGrp="1"/>
           </p:cNvSpPr>
@@ -2001,13 +2205,7 @@
       </p:sp>
       <p:sp>
         <p:nvSpPr>
-          <p:cNvPr id="5" name="Slide Number Placeholder 4">
-            <a:extLst>
-              <a:ext uri="{FF2B5EF4-FFF2-40B4-BE49-F238E27FC236}">
-                <a16:creationId xmlns:a16="http://schemas.microsoft.com/office/drawing/2014/main" id="{DCD942BE-5D0E-9445-9D5F-D281D6D0369C}"/>
-              </a:ext>
-            </a:extLst>
-          </p:cNvPr>
+          <p:cNvPr id="5" name="Slide Number Placeholder 4"/>
           <p:cNvSpPr>
             <a:spLocks noGrp="1"/>
           </p:cNvSpPr>
@@ -2031,7 +2229,7 @@
     </p:spTree>
     <p:extLst>
       <p:ext uri="{BB962C8B-B14F-4D97-AF65-F5344CB8AC3E}">
-        <p14:creationId xmlns:p14="http://schemas.microsoft.com/office/powerpoint/2010/main" val="1820346109"/>
+        <p14:creationId xmlns:p14="http://schemas.microsoft.com/office/powerpoint/2010/main" val="3136707684"/>
       </p:ext>
     </p:extLst>
   </p:cSld>
@@ -2060,13 +2258,7 @@
       </p:grpSpPr>
       <p:sp>
         <p:nvSpPr>
-          <p:cNvPr id="2" name="Date Placeholder 1">
-            <a:extLst>
-              <a:ext uri="{FF2B5EF4-FFF2-40B4-BE49-F238E27FC236}">
-                <a16:creationId xmlns:a16="http://schemas.microsoft.com/office/drawing/2014/main" id="{8CE49CB8-A598-864A-A17D-45A70CA96FD8}"/>
-              </a:ext>
-            </a:extLst>
-          </p:cNvPr>
+          <p:cNvPr id="2" name="Date Placeholder 1"/>
           <p:cNvSpPr>
             <a:spLocks noGrp="1"/>
           </p:cNvSpPr>
@@ -2089,13 +2281,7 @@
       </p:sp>
       <p:sp>
         <p:nvSpPr>
-          <p:cNvPr id="3" name="Footer Placeholder 2">
-            <a:extLst>
-              <a:ext uri="{FF2B5EF4-FFF2-40B4-BE49-F238E27FC236}">
-                <a16:creationId xmlns:a16="http://schemas.microsoft.com/office/drawing/2014/main" id="{7D6C8BFB-F701-774C-AE02-91DAAF2DCA4C}"/>
-              </a:ext>
-            </a:extLst>
-          </p:cNvPr>
+          <p:cNvPr id="3" name="Footer Placeholder 2"/>
           <p:cNvSpPr>
             <a:spLocks noGrp="1"/>
           </p:cNvSpPr>
@@ -2114,13 +2300,7 @@
       </p:sp>
       <p:sp>
         <p:nvSpPr>
-          <p:cNvPr id="4" name="Slide Number Placeholder 3">
-            <a:extLst>
-              <a:ext uri="{FF2B5EF4-FFF2-40B4-BE49-F238E27FC236}">
-                <a16:creationId xmlns:a16="http://schemas.microsoft.com/office/drawing/2014/main" id="{E4E9EBE7-2A1E-8D49-8D55-D029EF619D83}"/>
-              </a:ext>
-            </a:extLst>
-          </p:cNvPr>
+          <p:cNvPr id="4" name="Slide Number Placeholder 3"/>
           <p:cNvSpPr>
             <a:spLocks noGrp="1"/>
           </p:cNvSpPr>
@@ -2144,7 +2324,7 @@
     </p:spTree>
     <p:extLst>
       <p:ext uri="{BB962C8B-B14F-4D97-AF65-F5344CB8AC3E}">
-        <p14:creationId xmlns:p14="http://schemas.microsoft.com/office/powerpoint/2010/main" val="2271942005"/>
+        <p14:creationId xmlns:p14="http://schemas.microsoft.com/office/powerpoint/2010/main" val="1033169342"/>
       </p:ext>
     </p:extLst>
   </p:cSld>
@@ -2173,13 +2353,7 @@
       </p:grpSpPr>
       <p:sp>
         <p:nvSpPr>
-          <p:cNvPr id="2" name="Title 1">
-            <a:extLst>
-              <a:ext uri="{FF2B5EF4-FFF2-40B4-BE49-F238E27FC236}">
-                <a16:creationId xmlns:a16="http://schemas.microsoft.com/office/drawing/2014/main" id="{3E4A3835-30C9-004F-8BD7-DB6CBD32C777}"/>
-              </a:ext>
-            </a:extLst>
-          </p:cNvPr>
+          <p:cNvPr id="2" name="Title 1"/>
           <p:cNvSpPr>
             <a:spLocks noGrp="1"/>
           </p:cNvSpPr>
@@ -2189,15 +2363,15 @@
         </p:nvSpPr>
         <p:spPr>
           <a:xfrm>
-            <a:off x="839788" y="457200"/>
-            <a:ext cx="3932237" cy="1600200"/>
+            <a:off x="839789" y="381635"/>
+            <a:ext cx="3932237" cy="1335723"/>
           </a:xfrm>
         </p:spPr>
         <p:txBody>
           <a:bodyPr anchor="b"/>
           <a:lstStyle>
             <a:lvl1pPr>
-              <a:defRPr sz="3200"/>
+              <a:defRPr sz="2671"/>
             </a:lvl1pPr>
           </a:lstStyle>
           <a:p>
@@ -2205,19 +2379,13 @@
               <a:rPr lang="en-GB"/>
               <a:t>Click to edit Master title style</a:t>
             </a:r>
-            <a:endParaRPr lang="en-US"/>
-          </a:p>
-        </p:txBody>
-      </p:sp>
-      <p:sp>
-        <p:nvSpPr>
-          <p:cNvPr id="3" name="Content Placeholder 2">
-            <a:extLst>
-              <a:ext uri="{FF2B5EF4-FFF2-40B4-BE49-F238E27FC236}">
-                <a16:creationId xmlns:a16="http://schemas.microsoft.com/office/drawing/2014/main" id="{4ABAF8FE-7F3D-4247-B828-42B0FB12C171}"/>
-              </a:ext>
-            </a:extLst>
-          </p:cNvPr>
+            <a:endParaRPr lang="en-US" dirty="0"/>
+          </a:p>
+        </p:txBody>
+      </p:sp>
+      <p:sp>
+        <p:nvSpPr>
+          <p:cNvPr id="3" name="Content Placeholder 2"/>
           <p:cNvSpPr>
             <a:spLocks noGrp="1"/>
           </p:cNvSpPr>
@@ -2227,39 +2395,39 @@
         </p:nvSpPr>
         <p:spPr>
           <a:xfrm>
-            <a:off x="5183188" y="987425"/>
-            <a:ext cx="6172200" cy="4873625"/>
+            <a:off x="5183188" y="824226"/>
+            <a:ext cx="6172200" cy="4068123"/>
           </a:xfrm>
         </p:spPr>
         <p:txBody>
           <a:bodyPr/>
           <a:lstStyle>
             <a:lvl1pPr>
-              <a:defRPr sz="3200"/>
+              <a:defRPr sz="2671"/>
             </a:lvl1pPr>
             <a:lvl2pPr>
-              <a:defRPr sz="2800"/>
+              <a:defRPr sz="2337"/>
             </a:lvl2pPr>
             <a:lvl3pPr>
-              <a:defRPr sz="2400"/>
+              <a:defRPr sz="2003"/>
             </a:lvl3pPr>
             <a:lvl4pPr>
-              <a:defRPr sz="2000"/>
+              <a:defRPr sz="1669"/>
             </a:lvl4pPr>
             <a:lvl5pPr>
-              <a:defRPr sz="2000"/>
+              <a:defRPr sz="1669"/>
             </a:lvl5pPr>
             <a:lvl6pPr>
-              <a:defRPr sz="2000"/>
+              <a:defRPr sz="1669"/>
             </a:lvl6pPr>
             <a:lvl7pPr>
-              <a:defRPr sz="2000"/>
+              <a:defRPr sz="1669"/>
             </a:lvl7pPr>
             <a:lvl8pPr>
-              <a:defRPr sz="2000"/>
+              <a:defRPr sz="1669"/>
             </a:lvl8pPr>
             <a:lvl9pPr>
-              <a:defRPr sz="2000"/>
+              <a:defRPr sz="1669"/>
             </a:lvl9pPr>
           </a:lstStyle>
           <a:p>
@@ -2296,19 +2464,13 @@
               <a:rPr lang="en-GB"/>
               <a:t>Fifth level</a:t>
             </a:r>
-            <a:endParaRPr lang="en-US"/>
-          </a:p>
-        </p:txBody>
-      </p:sp>
-      <p:sp>
-        <p:nvSpPr>
-          <p:cNvPr id="4" name="Text Placeholder 3">
-            <a:extLst>
-              <a:ext uri="{FF2B5EF4-FFF2-40B4-BE49-F238E27FC236}">
-                <a16:creationId xmlns:a16="http://schemas.microsoft.com/office/drawing/2014/main" id="{2D56AACE-948B-6845-AD9F-608A544FBF04}"/>
-              </a:ext>
-            </a:extLst>
-          </p:cNvPr>
+            <a:endParaRPr lang="en-US" dirty="0"/>
+          </a:p>
+        </p:txBody>
+      </p:sp>
+      <p:sp>
+        <p:nvSpPr>
+          <p:cNvPr id="4" name="Text Placeholder 3"/>
           <p:cNvSpPr>
             <a:spLocks noGrp="1"/>
           </p:cNvSpPr>
@@ -2318,8 +2480,8 @@
         </p:nvSpPr>
         <p:spPr>
           <a:xfrm>
-            <a:off x="839788" y="2057400"/>
-            <a:ext cx="3932237" cy="3811588"/>
+            <a:off x="839789" y="1717358"/>
+            <a:ext cx="3932237" cy="3181617"/>
           </a:xfrm>
         </p:spPr>
         <p:txBody>
@@ -2327,39 +2489,39 @@
           <a:lstStyle>
             <a:lvl1pPr marL="0" indent="0">
               <a:buNone/>
-              <a:defRPr sz="1600"/>
+              <a:defRPr sz="1336"/>
             </a:lvl1pPr>
-            <a:lvl2pPr marL="457200" indent="0">
-              <a:buNone/>
-              <a:defRPr sz="1400"/>
+            <a:lvl2pPr marL="381625" indent="0">
+              <a:buNone/>
+              <a:defRPr sz="1169"/>
             </a:lvl2pPr>
-            <a:lvl3pPr marL="914400" indent="0">
-              <a:buNone/>
-              <a:defRPr sz="1200"/>
+            <a:lvl3pPr marL="763250" indent="0">
+              <a:buNone/>
+              <a:defRPr sz="1002"/>
             </a:lvl3pPr>
-            <a:lvl4pPr marL="1371600" indent="0">
-              <a:buNone/>
-              <a:defRPr sz="1000"/>
+            <a:lvl4pPr marL="1144875" indent="0">
+              <a:buNone/>
+              <a:defRPr sz="835"/>
             </a:lvl4pPr>
-            <a:lvl5pPr marL="1828800" indent="0">
-              <a:buNone/>
-              <a:defRPr sz="1000"/>
+            <a:lvl5pPr marL="1526499" indent="0">
+              <a:buNone/>
+              <a:defRPr sz="835"/>
             </a:lvl5pPr>
-            <a:lvl6pPr marL="2286000" indent="0">
-              <a:buNone/>
-              <a:defRPr sz="1000"/>
+            <a:lvl6pPr marL="1908124" indent="0">
+              <a:buNone/>
+              <a:defRPr sz="835"/>
             </a:lvl6pPr>
-            <a:lvl7pPr marL="2743200" indent="0">
-              <a:buNone/>
-              <a:defRPr sz="1000"/>
+            <a:lvl7pPr marL="2289749" indent="0">
+              <a:buNone/>
+              <a:defRPr sz="835"/>
             </a:lvl7pPr>
-            <a:lvl8pPr marL="3200400" indent="0">
-              <a:buNone/>
-              <a:defRPr sz="1000"/>
+            <a:lvl8pPr marL="2671374" indent="0">
+              <a:buNone/>
+              <a:defRPr sz="835"/>
             </a:lvl8pPr>
-            <a:lvl9pPr marL="3657600" indent="0">
-              <a:buNone/>
-              <a:defRPr sz="1000"/>
+            <a:lvl9pPr marL="3052999" indent="0">
+              <a:buNone/>
+              <a:defRPr sz="835"/>
             </a:lvl9pPr>
           </a:lstStyle>
           <a:p>
@@ -2373,13 +2535,7 @@
       </p:sp>
       <p:sp>
         <p:nvSpPr>
-          <p:cNvPr id="5" name="Date Placeholder 4">
-            <a:extLst>
-              <a:ext uri="{FF2B5EF4-FFF2-40B4-BE49-F238E27FC236}">
-                <a16:creationId xmlns:a16="http://schemas.microsoft.com/office/drawing/2014/main" id="{7AAEA144-901A-D44A-ADD1-729FF393F509}"/>
-              </a:ext>
-            </a:extLst>
-          </p:cNvPr>
+          <p:cNvPr id="5" name="Date Placeholder 4"/>
           <p:cNvSpPr>
             <a:spLocks noGrp="1"/>
           </p:cNvSpPr>
@@ -2402,13 +2558,7 @@
       </p:sp>
       <p:sp>
         <p:nvSpPr>
-          <p:cNvPr id="6" name="Footer Placeholder 5">
-            <a:extLst>
-              <a:ext uri="{FF2B5EF4-FFF2-40B4-BE49-F238E27FC236}">
-                <a16:creationId xmlns:a16="http://schemas.microsoft.com/office/drawing/2014/main" id="{5F160486-2373-B840-90C7-237CAEB11EDA}"/>
-              </a:ext>
-            </a:extLst>
-          </p:cNvPr>
+          <p:cNvPr id="6" name="Footer Placeholder 5"/>
           <p:cNvSpPr>
             <a:spLocks noGrp="1"/>
           </p:cNvSpPr>
@@ -2427,13 +2577,7 @@
       </p:sp>
       <p:sp>
         <p:nvSpPr>
-          <p:cNvPr id="7" name="Slide Number Placeholder 6">
-            <a:extLst>
-              <a:ext uri="{FF2B5EF4-FFF2-40B4-BE49-F238E27FC236}">
-                <a16:creationId xmlns:a16="http://schemas.microsoft.com/office/drawing/2014/main" id="{5231A5BE-4BE9-8844-B27E-BE12C8D7D2BE}"/>
-              </a:ext>
-            </a:extLst>
-          </p:cNvPr>
+          <p:cNvPr id="7" name="Slide Number Placeholder 6"/>
           <p:cNvSpPr>
             <a:spLocks noGrp="1"/>
           </p:cNvSpPr>
@@ -2457,7 +2601,7 @@
     </p:spTree>
     <p:extLst>
       <p:ext uri="{BB962C8B-B14F-4D97-AF65-F5344CB8AC3E}">
-        <p14:creationId xmlns:p14="http://schemas.microsoft.com/office/powerpoint/2010/main" val="1019940089"/>
+        <p14:creationId xmlns:p14="http://schemas.microsoft.com/office/powerpoint/2010/main" val="3640854213"/>
       </p:ext>
     </p:extLst>
   </p:cSld>
@@ -2486,13 +2630,7 @@
       </p:grpSpPr>
       <p:sp>
         <p:nvSpPr>
-          <p:cNvPr id="2" name="Title 1">
-            <a:extLst>
-              <a:ext uri="{FF2B5EF4-FFF2-40B4-BE49-F238E27FC236}">
-                <a16:creationId xmlns:a16="http://schemas.microsoft.com/office/drawing/2014/main" id="{655E553E-ADAA-EF46-8365-F543ABEFB16E}"/>
-              </a:ext>
-            </a:extLst>
-          </p:cNvPr>
+          <p:cNvPr id="2" name="Title 1"/>
           <p:cNvSpPr>
             <a:spLocks noGrp="1"/>
           </p:cNvSpPr>
@@ -2502,15 +2640,15 @@
         </p:nvSpPr>
         <p:spPr>
           <a:xfrm>
-            <a:off x="839788" y="457200"/>
-            <a:ext cx="3932237" cy="1600200"/>
+            <a:off x="839789" y="381635"/>
+            <a:ext cx="3932237" cy="1335723"/>
           </a:xfrm>
         </p:spPr>
         <p:txBody>
           <a:bodyPr anchor="b"/>
           <a:lstStyle>
             <a:lvl1pPr>
-              <a:defRPr sz="3200"/>
+              <a:defRPr sz="2671"/>
             </a:lvl1pPr>
           </a:lstStyle>
           <a:p>
@@ -2518,21 +2656,15 @@
               <a:rPr lang="en-GB"/>
               <a:t>Click to edit Master title style</a:t>
             </a:r>
-            <a:endParaRPr lang="en-US"/>
-          </a:p>
-        </p:txBody>
-      </p:sp>
-      <p:sp>
-        <p:nvSpPr>
-          <p:cNvPr id="3" name="Picture Placeholder 2">
-            <a:extLst>
-              <a:ext uri="{FF2B5EF4-FFF2-40B4-BE49-F238E27FC236}">
-                <a16:creationId xmlns:a16="http://schemas.microsoft.com/office/drawing/2014/main" id="{00BC1196-20C9-9C4A-9EED-19E0C9371276}"/>
-              </a:ext>
-            </a:extLst>
-          </p:cNvPr>
-          <p:cNvSpPr>
-            <a:spLocks noGrp="1"/>
+            <a:endParaRPr lang="en-US" dirty="0"/>
+          </a:p>
+        </p:txBody>
+      </p:sp>
+      <p:sp>
+        <p:nvSpPr>
+          <p:cNvPr id="3" name="Picture Placeholder 2"/>
+          <p:cNvSpPr>
+            <a:spLocks noGrp="1" noChangeAspect="1"/>
           </p:cNvSpPr>
           <p:nvPr>
             <p:ph type="pic" idx="1"/>
@@ -2540,64 +2672,62 @@
         </p:nvSpPr>
         <p:spPr>
           <a:xfrm>
-            <a:off x="5183188" y="987425"/>
-            <a:ext cx="6172200" cy="4873625"/>
+            <a:off x="5183188" y="824226"/>
+            <a:ext cx="6172200" cy="4068123"/>
           </a:xfrm>
         </p:spPr>
         <p:txBody>
-          <a:bodyPr/>
+          <a:bodyPr anchor="t"/>
           <a:lstStyle>
             <a:lvl1pPr marL="0" indent="0">
               <a:buNone/>
-              <a:defRPr sz="3200"/>
+              <a:defRPr sz="2671"/>
             </a:lvl1pPr>
-            <a:lvl2pPr marL="457200" indent="0">
-              <a:buNone/>
-              <a:defRPr sz="2800"/>
+            <a:lvl2pPr marL="381625" indent="0">
+              <a:buNone/>
+              <a:defRPr sz="2337"/>
             </a:lvl2pPr>
-            <a:lvl3pPr marL="914400" indent="0">
-              <a:buNone/>
-              <a:defRPr sz="2400"/>
+            <a:lvl3pPr marL="763250" indent="0">
+              <a:buNone/>
+              <a:defRPr sz="2003"/>
             </a:lvl3pPr>
-            <a:lvl4pPr marL="1371600" indent="0">
-              <a:buNone/>
-              <a:defRPr sz="2000"/>
+            <a:lvl4pPr marL="1144875" indent="0">
+              <a:buNone/>
+              <a:defRPr sz="1669"/>
             </a:lvl4pPr>
-            <a:lvl5pPr marL="1828800" indent="0">
-              <a:buNone/>
-              <a:defRPr sz="2000"/>
+            <a:lvl5pPr marL="1526499" indent="0">
+              <a:buNone/>
+              <a:defRPr sz="1669"/>
             </a:lvl5pPr>
-            <a:lvl6pPr marL="2286000" indent="0">
-              <a:buNone/>
-              <a:defRPr sz="2000"/>
+            <a:lvl6pPr marL="1908124" indent="0">
+              <a:buNone/>
+              <a:defRPr sz="1669"/>
             </a:lvl6pPr>
-            <a:lvl7pPr marL="2743200" indent="0">
-              <a:buNone/>
-              <a:defRPr sz="2000"/>
+            <a:lvl7pPr marL="2289749" indent="0">
+              <a:buNone/>
+              <a:defRPr sz="1669"/>
             </a:lvl7pPr>
-            <a:lvl8pPr marL="3200400" indent="0">
-              <a:buNone/>
-              <a:defRPr sz="2000"/>
+            <a:lvl8pPr marL="2671374" indent="0">
+              <a:buNone/>
+              <a:defRPr sz="1669"/>
             </a:lvl8pPr>
-            <a:lvl9pPr marL="3657600" indent="0">
-              <a:buNone/>
-              <a:defRPr sz="2000"/>
+            <a:lvl9pPr marL="3052999" indent="0">
+              <a:buNone/>
+              <a:defRPr sz="1669"/>
             </a:lvl9pPr>
           </a:lstStyle>
           <a:p>
-            <a:endParaRPr lang="en-US"/>
-          </a:p>
-        </p:txBody>
-      </p:sp>
-      <p:sp>
-        <p:nvSpPr>
-          <p:cNvPr id="4" name="Text Placeholder 3">
-            <a:extLst>
-              <a:ext uri="{FF2B5EF4-FFF2-40B4-BE49-F238E27FC236}">
-                <a16:creationId xmlns:a16="http://schemas.microsoft.com/office/drawing/2014/main" id="{7571B75F-5BA9-3444-A18B-6474FB1A6FC9}"/>
-              </a:ext>
-            </a:extLst>
-          </p:cNvPr>
+            <a:r>
+              <a:rPr lang="en-GB"/>
+              <a:t>Click icon to add picture</a:t>
+            </a:r>
+            <a:endParaRPr lang="en-US" dirty="0"/>
+          </a:p>
+        </p:txBody>
+      </p:sp>
+      <p:sp>
+        <p:nvSpPr>
+          <p:cNvPr id="4" name="Text Placeholder 3"/>
           <p:cNvSpPr>
             <a:spLocks noGrp="1"/>
           </p:cNvSpPr>
@@ -2607,8 +2737,8 @@
         </p:nvSpPr>
         <p:spPr>
           <a:xfrm>
-            <a:off x="839788" y="2057400"/>
-            <a:ext cx="3932237" cy="3811588"/>
+            <a:off x="839789" y="1717358"/>
+            <a:ext cx="3932237" cy="3181617"/>
           </a:xfrm>
         </p:spPr>
         <p:txBody>
@@ -2616,39 +2746,39 @@
           <a:lstStyle>
             <a:lvl1pPr marL="0" indent="0">
               <a:buNone/>
-              <a:defRPr sz="1600"/>
+              <a:defRPr sz="1336"/>
             </a:lvl1pPr>
-            <a:lvl2pPr marL="457200" indent="0">
-              <a:buNone/>
-              <a:defRPr sz="1400"/>
+            <a:lvl2pPr marL="381625" indent="0">
+              <a:buNone/>
+              <a:defRPr sz="1169"/>
             </a:lvl2pPr>
-            <a:lvl3pPr marL="914400" indent="0">
-              <a:buNone/>
-              <a:defRPr sz="1200"/>
+            <a:lvl3pPr marL="763250" indent="0">
+              <a:buNone/>
+              <a:defRPr sz="1002"/>
             </a:lvl3pPr>
-            <a:lvl4pPr marL="1371600" indent="0">
-              <a:buNone/>
-              <a:defRPr sz="1000"/>
+            <a:lvl4pPr marL="1144875" indent="0">
+              <a:buNone/>
+              <a:defRPr sz="835"/>
             </a:lvl4pPr>
-            <a:lvl5pPr marL="1828800" indent="0">
-              <a:buNone/>
-              <a:defRPr sz="1000"/>
+            <a:lvl5pPr marL="1526499" indent="0">
+              <a:buNone/>
+              <a:defRPr sz="835"/>
             </a:lvl5pPr>
-            <a:lvl6pPr marL="2286000" indent="0">
-              <a:buNone/>
-              <a:defRPr sz="1000"/>
+            <a:lvl6pPr marL="1908124" indent="0">
+              <a:buNone/>
+              <a:defRPr sz="835"/>
             </a:lvl6pPr>
-            <a:lvl7pPr marL="2743200" indent="0">
-              <a:buNone/>
-              <a:defRPr sz="1000"/>
+            <a:lvl7pPr marL="2289749" indent="0">
+              <a:buNone/>
+              <a:defRPr sz="835"/>
             </a:lvl7pPr>
-            <a:lvl8pPr marL="3200400" indent="0">
-              <a:buNone/>
-              <a:defRPr sz="1000"/>
+            <a:lvl8pPr marL="2671374" indent="0">
+              <a:buNone/>
+              <a:defRPr sz="835"/>
             </a:lvl8pPr>
-            <a:lvl9pPr marL="3657600" indent="0">
-              <a:buNone/>
-              <a:defRPr sz="1000"/>
+            <a:lvl9pPr marL="3052999" indent="0">
+              <a:buNone/>
+              <a:defRPr sz="835"/>
             </a:lvl9pPr>
           </a:lstStyle>
           <a:p>
@@ -2662,13 +2792,7 @@
       </p:sp>
       <p:sp>
         <p:nvSpPr>
-          <p:cNvPr id="5" name="Date Placeholder 4">
-            <a:extLst>
-              <a:ext uri="{FF2B5EF4-FFF2-40B4-BE49-F238E27FC236}">
-                <a16:creationId xmlns:a16="http://schemas.microsoft.com/office/drawing/2014/main" id="{FD68BD0A-9565-2443-8F2C-F45192F80BD3}"/>
-              </a:ext>
-            </a:extLst>
-          </p:cNvPr>
+          <p:cNvPr id="5" name="Date Placeholder 4"/>
           <p:cNvSpPr>
             <a:spLocks noGrp="1"/>
           </p:cNvSpPr>
@@ -2691,13 +2815,7 @@
       </p:sp>
       <p:sp>
         <p:nvSpPr>
-          <p:cNvPr id="6" name="Footer Placeholder 5">
-            <a:extLst>
-              <a:ext uri="{FF2B5EF4-FFF2-40B4-BE49-F238E27FC236}">
-                <a16:creationId xmlns:a16="http://schemas.microsoft.com/office/drawing/2014/main" id="{7AC3234C-2C23-6047-9B11-F48F72B49831}"/>
-              </a:ext>
-            </a:extLst>
-          </p:cNvPr>
+          <p:cNvPr id="6" name="Footer Placeholder 5"/>
           <p:cNvSpPr>
             <a:spLocks noGrp="1"/>
           </p:cNvSpPr>
@@ -2716,13 +2834,7 @@
       </p:sp>
       <p:sp>
         <p:nvSpPr>
-          <p:cNvPr id="7" name="Slide Number Placeholder 6">
-            <a:extLst>
-              <a:ext uri="{FF2B5EF4-FFF2-40B4-BE49-F238E27FC236}">
-                <a16:creationId xmlns:a16="http://schemas.microsoft.com/office/drawing/2014/main" id="{B173EB0D-1AB8-484A-A0F4-9E3D90520827}"/>
-              </a:ext>
-            </a:extLst>
-          </p:cNvPr>
+          <p:cNvPr id="7" name="Slide Number Placeholder 6"/>
           <p:cNvSpPr>
             <a:spLocks noGrp="1"/>
           </p:cNvSpPr>
@@ -2746,7 +2858,7 @@
     </p:spTree>
     <p:extLst>
       <p:ext uri="{BB962C8B-B14F-4D97-AF65-F5344CB8AC3E}">
-        <p14:creationId xmlns:p14="http://schemas.microsoft.com/office/powerpoint/2010/main" val="2871777540"/>
+        <p14:creationId xmlns:p14="http://schemas.microsoft.com/office/powerpoint/2010/main" val="2474395194"/>
       </p:ext>
     </p:extLst>
   </p:cSld>
@@ -2780,13 +2892,7 @@
       </p:grpSpPr>
       <p:sp>
         <p:nvSpPr>
-          <p:cNvPr id="2" name="Title Placeholder 1">
-            <a:extLst>
-              <a:ext uri="{FF2B5EF4-FFF2-40B4-BE49-F238E27FC236}">
-                <a16:creationId xmlns:a16="http://schemas.microsoft.com/office/drawing/2014/main" id="{ADE1F520-7511-FD44-9B7E-B8CCE3DC0838}"/>
-              </a:ext>
-            </a:extLst>
-          </p:cNvPr>
+          <p:cNvPr id="2" name="Title Placeholder 1"/>
           <p:cNvSpPr>
             <a:spLocks noGrp="1"/>
           </p:cNvSpPr>
@@ -2796,8 +2902,8 @@
         </p:nvSpPr>
         <p:spPr>
           <a:xfrm>
-            <a:off x="838200" y="365125"/>
-            <a:ext cx="10515600" cy="1325563"/>
+            <a:off x="838200" y="304778"/>
+            <a:ext cx="10515600" cy="1106477"/>
           </a:xfrm>
           <a:prstGeom prst="rect">
             <a:avLst/>
@@ -2813,19 +2919,13 @@
               <a:rPr lang="en-GB"/>
               <a:t>Click to edit Master title style</a:t>
             </a:r>
-            <a:endParaRPr lang="en-US"/>
-          </a:p>
-        </p:txBody>
-      </p:sp>
-      <p:sp>
-        <p:nvSpPr>
-          <p:cNvPr id="3" name="Text Placeholder 2">
-            <a:extLst>
-              <a:ext uri="{FF2B5EF4-FFF2-40B4-BE49-F238E27FC236}">
-                <a16:creationId xmlns:a16="http://schemas.microsoft.com/office/drawing/2014/main" id="{EAE60714-E605-A143-926E-0FB1647C91CA}"/>
-              </a:ext>
-            </a:extLst>
-          </p:cNvPr>
+            <a:endParaRPr lang="en-US" dirty="0"/>
+          </a:p>
+        </p:txBody>
+      </p:sp>
+      <p:sp>
+        <p:nvSpPr>
+          <p:cNvPr id="3" name="Text Placeholder 2"/>
           <p:cNvSpPr>
             <a:spLocks noGrp="1"/>
           </p:cNvSpPr>
@@ -2835,8 +2935,8 @@
         </p:nvSpPr>
         <p:spPr>
           <a:xfrm>
-            <a:off x="838200" y="1825625"/>
-            <a:ext cx="10515600" cy="4351338"/>
+            <a:off x="838200" y="1523890"/>
+            <a:ext cx="10515600" cy="3632159"/>
           </a:xfrm>
           <a:prstGeom prst="rect">
             <a:avLst/>
@@ -2881,19 +2981,13 @@
               <a:rPr lang="en-GB"/>
               <a:t>Fifth level</a:t>
             </a:r>
-            <a:endParaRPr lang="en-US"/>
-          </a:p>
-        </p:txBody>
-      </p:sp>
-      <p:sp>
-        <p:nvSpPr>
-          <p:cNvPr id="4" name="Date Placeholder 3">
-            <a:extLst>
-              <a:ext uri="{FF2B5EF4-FFF2-40B4-BE49-F238E27FC236}">
-                <a16:creationId xmlns:a16="http://schemas.microsoft.com/office/drawing/2014/main" id="{A712BC79-2411-EF46-8384-C80AE1A19497}"/>
-              </a:ext>
-            </a:extLst>
-          </p:cNvPr>
+            <a:endParaRPr lang="en-US" dirty="0"/>
+          </a:p>
+        </p:txBody>
+      </p:sp>
+      <p:sp>
+        <p:nvSpPr>
+          <p:cNvPr id="4" name="Date Placeholder 3"/>
           <p:cNvSpPr>
             <a:spLocks noGrp="1"/>
           </p:cNvSpPr>
@@ -2903,8 +2997,8 @@
         </p:nvSpPr>
         <p:spPr>
           <a:xfrm>
-            <a:off x="838200" y="6356350"/>
-            <a:ext cx="2743200" cy="365125"/>
+            <a:off x="838200" y="5305787"/>
+            <a:ext cx="2743200" cy="304778"/>
           </a:xfrm>
           <a:prstGeom prst="rect">
             <a:avLst/>
@@ -2914,7 +3008,7 @@
           <a:bodyPr vert="horz" lIns="91440" tIns="45720" rIns="91440" bIns="45720" rtlCol="0" anchor="ctr"/>
           <a:lstStyle>
             <a:lvl1pPr algn="l">
-              <a:defRPr sz="1200">
+              <a:defRPr sz="1002">
                 <a:solidFill>
                   <a:schemeClr val="tx1">
                     <a:tint val="75000"/>
@@ -2934,13 +3028,7 @@
       </p:sp>
       <p:sp>
         <p:nvSpPr>
-          <p:cNvPr id="5" name="Footer Placeholder 4">
-            <a:extLst>
-              <a:ext uri="{FF2B5EF4-FFF2-40B4-BE49-F238E27FC236}">
-                <a16:creationId xmlns:a16="http://schemas.microsoft.com/office/drawing/2014/main" id="{2BF2C630-756E-594C-BE7F-D607633F0F1B}"/>
-              </a:ext>
-            </a:extLst>
-          </p:cNvPr>
+          <p:cNvPr id="5" name="Footer Placeholder 4"/>
           <p:cNvSpPr>
             <a:spLocks noGrp="1"/>
           </p:cNvSpPr>
@@ -2950,8 +3038,8 @@
         </p:nvSpPr>
         <p:spPr>
           <a:xfrm>
-            <a:off x="4038600" y="6356350"/>
-            <a:ext cx="4114800" cy="365125"/>
+            <a:off x="4038600" y="5305787"/>
+            <a:ext cx="4114800" cy="304778"/>
           </a:xfrm>
           <a:prstGeom prst="rect">
             <a:avLst/>
@@ -2961,7 +3049,7 @@
           <a:bodyPr vert="horz" lIns="91440" tIns="45720" rIns="91440" bIns="45720" rtlCol="0" anchor="ctr"/>
           <a:lstStyle>
             <a:lvl1pPr algn="ctr">
-              <a:defRPr sz="1200">
+              <a:defRPr sz="1002">
                 <a:solidFill>
                   <a:schemeClr val="tx1">
                     <a:tint val="75000"/>
@@ -2977,13 +3065,7 @@
       </p:sp>
       <p:sp>
         <p:nvSpPr>
-          <p:cNvPr id="6" name="Slide Number Placeholder 5">
-            <a:extLst>
-              <a:ext uri="{FF2B5EF4-FFF2-40B4-BE49-F238E27FC236}">
-                <a16:creationId xmlns:a16="http://schemas.microsoft.com/office/drawing/2014/main" id="{0F675BCD-7535-C146-A75A-357DCFBB8937}"/>
-              </a:ext>
-            </a:extLst>
-          </p:cNvPr>
+          <p:cNvPr id="6" name="Slide Number Placeholder 5"/>
           <p:cNvSpPr>
             <a:spLocks noGrp="1"/>
           </p:cNvSpPr>
@@ -2993,8 +3075,8 @@
         </p:nvSpPr>
         <p:spPr>
           <a:xfrm>
-            <a:off x="8610600" y="6356350"/>
-            <a:ext cx="2743200" cy="365125"/>
+            <a:off x="8610600" y="5305787"/>
+            <a:ext cx="2743200" cy="304778"/>
           </a:xfrm>
           <a:prstGeom prst="rect">
             <a:avLst/>
@@ -3004,7 +3086,7 @@
           <a:bodyPr vert="horz" lIns="91440" tIns="45720" rIns="91440" bIns="45720" rtlCol="0" anchor="ctr"/>
           <a:lstStyle>
             <a:lvl1pPr algn="r">
-              <a:defRPr sz="1200">
+              <a:defRPr sz="1002">
                 <a:solidFill>
                   <a:schemeClr val="tx1">
                     <a:tint val="75000"/>
@@ -3025,27 +3107,27 @@
     </p:spTree>
     <p:extLst>
       <p:ext uri="{BB962C8B-B14F-4D97-AF65-F5344CB8AC3E}">
-        <p14:creationId xmlns:p14="http://schemas.microsoft.com/office/powerpoint/2010/main" val="2994437272"/>
+        <p14:creationId xmlns:p14="http://schemas.microsoft.com/office/powerpoint/2010/main" val="3469081324"/>
       </p:ext>
     </p:extLst>
   </p:cSld>
   <p:clrMap bg1="lt1" tx1="dk1" bg2="lt2" tx2="dk2" accent1="accent1" accent2="accent2" accent3="accent3" accent4="accent4" accent5="accent5" accent6="accent6" hlink="hlink" folHlink="folHlink"/>
   <p:sldLayoutIdLst>
-    <p:sldLayoutId id="2147483649" r:id="rId1"/>
-    <p:sldLayoutId id="2147483650" r:id="rId2"/>
-    <p:sldLayoutId id="2147483651" r:id="rId3"/>
-    <p:sldLayoutId id="2147483652" r:id="rId4"/>
-    <p:sldLayoutId id="2147483653" r:id="rId5"/>
-    <p:sldLayoutId id="2147483654" r:id="rId6"/>
-    <p:sldLayoutId id="2147483655" r:id="rId7"/>
-    <p:sldLayoutId id="2147483656" r:id="rId8"/>
-    <p:sldLayoutId id="2147483657" r:id="rId9"/>
-    <p:sldLayoutId id="2147483658" r:id="rId10"/>
-    <p:sldLayoutId id="2147483659" r:id="rId11"/>
+    <p:sldLayoutId id="2147483673" r:id="rId1"/>
+    <p:sldLayoutId id="2147483674" r:id="rId2"/>
+    <p:sldLayoutId id="2147483675" r:id="rId3"/>
+    <p:sldLayoutId id="2147483676" r:id="rId4"/>
+    <p:sldLayoutId id="2147483677" r:id="rId5"/>
+    <p:sldLayoutId id="2147483678" r:id="rId6"/>
+    <p:sldLayoutId id="2147483679" r:id="rId7"/>
+    <p:sldLayoutId id="2147483680" r:id="rId8"/>
+    <p:sldLayoutId id="2147483681" r:id="rId9"/>
+    <p:sldLayoutId id="2147483682" r:id="rId10"/>
+    <p:sldLayoutId id="2147483683" r:id="rId11"/>
   </p:sldLayoutIdLst>
   <p:txStyles>
     <p:titleStyle>
-      <a:lvl1pPr algn="l" defTabSz="914400" rtl="0" eaLnBrk="1" latinLnBrk="0" hangingPunct="1">
+      <a:lvl1pPr algn="l" defTabSz="763250" rtl="0" eaLnBrk="1" latinLnBrk="0" hangingPunct="1">
         <a:lnSpc>
           <a:spcPct val="90000"/>
         </a:lnSpc>
@@ -3053,7 +3135,7 @@
           <a:spcPct val="0"/>
         </a:spcBef>
         <a:buNone/>
-        <a:defRPr sz="4400" kern="1200">
+        <a:defRPr sz="3673" kern="1200">
           <a:solidFill>
             <a:schemeClr val="tx1"/>
           </a:solidFill>
@@ -3064,16 +3146,16 @@
       </a:lvl1pPr>
     </p:titleStyle>
     <p:bodyStyle>
-      <a:lvl1pPr marL="228600" indent="-228600" algn="l" defTabSz="914400" rtl="0" eaLnBrk="1" latinLnBrk="0" hangingPunct="1">
+      <a:lvl1pPr marL="190812" indent="-190812" algn="l" defTabSz="763250" rtl="0" eaLnBrk="1" latinLnBrk="0" hangingPunct="1">
         <a:lnSpc>
           <a:spcPct val="90000"/>
         </a:lnSpc>
         <a:spcBef>
-          <a:spcPts val="1000"/>
+          <a:spcPts val="835"/>
         </a:spcBef>
         <a:buFont typeface="Arial" panose="020B0604020202020204" pitchFamily="34" charset="0"/>
         <a:buChar char="•"/>
-        <a:defRPr sz="2800" kern="1200">
+        <a:defRPr sz="2337" kern="1200">
           <a:solidFill>
             <a:schemeClr val="tx1"/>
           </a:solidFill>
@@ -3082,16 +3164,16 @@
           <a:cs typeface="+mn-cs"/>
         </a:defRPr>
       </a:lvl1pPr>
-      <a:lvl2pPr marL="685800" indent="-228600" algn="l" defTabSz="914400" rtl="0" eaLnBrk="1" latinLnBrk="0" hangingPunct="1">
+      <a:lvl2pPr marL="572437" indent="-190812" algn="l" defTabSz="763250" rtl="0" eaLnBrk="1" latinLnBrk="0" hangingPunct="1">
         <a:lnSpc>
           <a:spcPct val="90000"/>
         </a:lnSpc>
         <a:spcBef>
-          <a:spcPts val="500"/>
+          <a:spcPts val="417"/>
         </a:spcBef>
         <a:buFont typeface="Arial" panose="020B0604020202020204" pitchFamily="34" charset="0"/>
         <a:buChar char="•"/>
-        <a:defRPr sz="2400" kern="1200">
+        <a:defRPr sz="2003" kern="1200">
           <a:solidFill>
             <a:schemeClr val="tx1"/>
           </a:solidFill>
@@ -3100,16 +3182,16 @@
           <a:cs typeface="+mn-cs"/>
         </a:defRPr>
       </a:lvl2pPr>
-      <a:lvl3pPr marL="1143000" indent="-228600" algn="l" defTabSz="914400" rtl="0" eaLnBrk="1" latinLnBrk="0" hangingPunct="1">
+      <a:lvl3pPr marL="954062" indent="-190812" algn="l" defTabSz="763250" rtl="0" eaLnBrk="1" latinLnBrk="0" hangingPunct="1">
         <a:lnSpc>
           <a:spcPct val="90000"/>
         </a:lnSpc>
         <a:spcBef>
-          <a:spcPts val="500"/>
+          <a:spcPts val="417"/>
         </a:spcBef>
         <a:buFont typeface="Arial" panose="020B0604020202020204" pitchFamily="34" charset="0"/>
         <a:buChar char="•"/>
-        <a:defRPr sz="2000" kern="1200">
+        <a:defRPr sz="1669" kern="1200">
           <a:solidFill>
             <a:schemeClr val="tx1"/>
           </a:solidFill>
@@ -3118,16 +3200,16 @@
           <a:cs typeface="+mn-cs"/>
         </a:defRPr>
       </a:lvl3pPr>
-      <a:lvl4pPr marL="1600200" indent="-228600" algn="l" defTabSz="914400" rtl="0" eaLnBrk="1" latinLnBrk="0" hangingPunct="1">
+      <a:lvl4pPr marL="1335687" indent="-190812" algn="l" defTabSz="763250" rtl="0" eaLnBrk="1" latinLnBrk="0" hangingPunct="1">
         <a:lnSpc>
           <a:spcPct val="90000"/>
         </a:lnSpc>
         <a:spcBef>
-          <a:spcPts val="500"/>
+          <a:spcPts val="417"/>
         </a:spcBef>
         <a:buFont typeface="Arial" panose="020B0604020202020204" pitchFamily="34" charset="0"/>
         <a:buChar char="•"/>
-        <a:defRPr sz="1800" kern="1200">
+        <a:defRPr sz="1502" kern="1200">
           <a:solidFill>
             <a:schemeClr val="tx1"/>
           </a:solidFill>
@@ -3136,16 +3218,16 @@
           <a:cs typeface="+mn-cs"/>
         </a:defRPr>
       </a:lvl4pPr>
-      <a:lvl5pPr marL="2057400" indent="-228600" algn="l" defTabSz="914400" rtl="0" eaLnBrk="1" latinLnBrk="0" hangingPunct="1">
+      <a:lvl5pPr marL="1717312" indent="-190812" algn="l" defTabSz="763250" rtl="0" eaLnBrk="1" latinLnBrk="0" hangingPunct="1">
         <a:lnSpc>
           <a:spcPct val="90000"/>
         </a:lnSpc>
         <a:spcBef>
-          <a:spcPts val="500"/>
+          <a:spcPts val="417"/>
         </a:spcBef>
         <a:buFont typeface="Arial" panose="020B0604020202020204" pitchFamily="34" charset="0"/>
         <a:buChar char="•"/>
-        <a:defRPr sz="1800" kern="1200">
+        <a:defRPr sz="1502" kern="1200">
           <a:solidFill>
             <a:schemeClr val="tx1"/>
           </a:solidFill>
@@ -3154,16 +3236,16 @@
           <a:cs typeface="+mn-cs"/>
         </a:defRPr>
       </a:lvl5pPr>
-      <a:lvl6pPr marL="2514600" indent="-228600" algn="l" defTabSz="914400" rtl="0" eaLnBrk="1" latinLnBrk="0" hangingPunct="1">
+      <a:lvl6pPr marL="2098937" indent="-190812" algn="l" defTabSz="763250" rtl="0" eaLnBrk="1" latinLnBrk="0" hangingPunct="1">
         <a:lnSpc>
           <a:spcPct val="90000"/>
         </a:lnSpc>
         <a:spcBef>
-          <a:spcPts val="500"/>
+          <a:spcPts val="417"/>
         </a:spcBef>
         <a:buFont typeface="Arial" panose="020B0604020202020204" pitchFamily="34" charset="0"/>
         <a:buChar char="•"/>
-        <a:defRPr sz="1800" kern="1200">
+        <a:defRPr sz="1502" kern="1200">
           <a:solidFill>
             <a:schemeClr val="tx1"/>
           </a:solidFill>
@@ -3172,16 +3254,16 @@
           <a:cs typeface="+mn-cs"/>
         </a:defRPr>
       </a:lvl6pPr>
-      <a:lvl7pPr marL="2971800" indent="-228600" algn="l" defTabSz="914400" rtl="0" eaLnBrk="1" latinLnBrk="0" hangingPunct="1">
+      <a:lvl7pPr marL="2480561" indent="-190812" algn="l" defTabSz="763250" rtl="0" eaLnBrk="1" latinLnBrk="0" hangingPunct="1">
         <a:lnSpc>
           <a:spcPct val="90000"/>
         </a:lnSpc>
         <a:spcBef>
-          <a:spcPts val="500"/>
+          <a:spcPts val="417"/>
         </a:spcBef>
         <a:buFont typeface="Arial" panose="020B0604020202020204" pitchFamily="34" charset="0"/>
         <a:buChar char="•"/>
-        <a:defRPr sz="1800" kern="1200">
+        <a:defRPr sz="1502" kern="1200">
           <a:solidFill>
             <a:schemeClr val="tx1"/>
           </a:solidFill>
@@ -3190,16 +3272,16 @@
           <a:cs typeface="+mn-cs"/>
         </a:defRPr>
       </a:lvl7pPr>
-      <a:lvl8pPr marL="3429000" indent="-228600" algn="l" defTabSz="914400" rtl="0" eaLnBrk="1" latinLnBrk="0" hangingPunct="1">
+      <a:lvl8pPr marL="2862186" indent="-190812" algn="l" defTabSz="763250" rtl="0" eaLnBrk="1" latinLnBrk="0" hangingPunct="1">
         <a:lnSpc>
           <a:spcPct val="90000"/>
         </a:lnSpc>
         <a:spcBef>
-          <a:spcPts val="500"/>
+          <a:spcPts val="417"/>
         </a:spcBef>
         <a:buFont typeface="Arial" panose="020B0604020202020204" pitchFamily="34" charset="0"/>
         <a:buChar char="•"/>
-        <a:defRPr sz="1800" kern="1200">
+        <a:defRPr sz="1502" kern="1200">
           <a:solidFill>
             <a:schemeClr val="tx1"/>
           </a:solidFill>
@@ -3208,16 +3290,16 @@
           <a:cs typeface="+mn-cs"/>
         </a:defRPr>
       </a:lvl8pPr>
-      <a:lvl9pPr marL="3886200" indent="-228600" algn="l" defTabSz="914400" rtl="0" eaLnBrk="1" latinLnBrk="0" hangingPunct="1">
+      <a:lvl9pPr marL="3243811" indent="-190812" algn="l" defTabSz="763250" rtl="0" eaLnBrk="1" latinLnBrk="0" hangingPunct="1">
         <a:lnSpc>
           <a:spcPct val="90000"/>
         </a:lnSpc>
         <a:spcBef>
-          <a:spcPts val="500"/>
+          <a:spcPts val="417"/>
         </a:spcBef>
         <a:buFont typeface="Arial" panose="020B0604020202020204" pitchFamily="34" charset="0"/>
         <a:buChar char="•"/>
-        <a:defRPr sz="1800" kern="1200">
+        <a:defRPr sz="1502" kern="1200">
           <a:solidFill>
             <a:schemeClr val="tx1"/>
           </a:solidFill>
@@ -3231,8 +3313,8 @@
       <a:defPPr>
         <a:defRPr lang="en-US"/>
       </a:defPPr>
-      <a:lvl1pPr marL="0" algn="l" defTabSz="914400" rtl="0" eaLnBrk="1" latinLnBrk="0" hangingPunct="1">
-        <a:defRPr sz="1800" kern="1200">
+      <a:lvl1pPr marL="0" algn="l" defTabSz="763250" rtl="0" eaLnBrk="1" latinLnBrk="0" hangingPunct="1">
+        <a:defRPr sz="1502" kern="1200">
           <a:solidFill>
             <a:schemeClr val="tx1"/>
           </a:solidFill>
@@ -3241,8 +3323,8 @@
           <a:cs typeface="+mn-cs"/>
         </a:defRPr>
       </a:lvl1pPr>
-      <a:lvl2pPr marL="457200" algn="l" defTabSz="914400" rtl="0" eaLnBrk="1" latinLnBrk="0" hangingPunct="1">
-        <a:defRPr sz="1800" kern="1200">
+      <a:lvl2pPr marL="381625" algn="l" defTabSz="763250" rtl="0" eaLnBrk="1" latinLnBrk="0" hangingPunct="1">
+        <a:defRPr sz="1502" kern="1200">
           <a:solidFill>
             <a:schemeClr val="tx1"/>
           </a:solidFill>
@@ -3251,8 +3333,8 @@
           <a:cs typeface="+mn-cs"/>
         </a:defRPr>
       </a:lvl2pPr>
-      <a:lvl3pPr marL="914400" algn="l" defTabSz="914400" rtl="0" eaLnBrk="1" latinLnBrk="0" hangingPunct="1">
-        <a:defRPr sz="1800" kern="1200">
+      <a:lvl3pPr marL="763250" algn="l" defTabSz="763250" rtl="0" eaLnBrk="1" latinLnBrk="0" hangingPunct="1">
+        <a:defRPr sz="1502" kern="1200">
           <a:solidFill>
             <a:schemeClr val="tx1"/>
           </a:solidFill>
@@ -3261,8 +3343,8 @@
           <a:cs typeface="+mn-cs"/>
         </a:defRPr>
       </a:lvl3pPr>
-      <a:lvl4pPr marL="1371600" algn="l" defTabSz="914400" rtl="0" eaLnBrk="1" latinLnBrk="0" hangingPunct="1">
-        <a:defRPr sz="1800" kern="1200">
+      <a:lvl4pPr marL="1144875" algn="l" defTabSz="763250" rtl="0" eaLnBrk="1" latinLnBrk="0" hangingPunct="1">
+        <a:defRPr sz="1502" kern="1200">
           <a:solidFill>
             <a:schemeClr val="tx1"/>
           </a:solidFill>
@@ -3271,8 +3353,8 @@
           <a:cs typeface="+mn-cs"/>
         </a:defRPr>
       </a:lvl4pPr>
-      <a:lvl5pPr marL="1828800" algn="l" defTabSz="914400" rtl="0" eaLnBrk="1" latinLnBrk="0" hangingPunct="1">
-        <a:defRPr sz="1800" kern="1200">
+      <a:lvl5pPr marL="1526499" algn="l" defTabSz="763250" rtl="0" eaLnBrk="1" latinLnBrk="0" hangingPunct="1">
+        <a:defRPr sz="1502" kern="1200">
           <a:solidFill>
             <a:schemeClr val="tx1"/>
           </a:solidFill>
@@ -3281,8 +3363,8 @@
           <a:cs typeface="+mn-cs"/>
         </a:defRPr>
       </a:lvl5pPr>
-      <a:lvl6pPr marL="2286000" algn="l" defTabSz="914400" rtl="0" eaLnBrk="1" latinLnBrk="0" hangingPunct="1">
-        <a:defRPr sz="1800" kern="1200">
+      <a:lvl6pPr marL="1908124" algn="l" defTabSz="763250" rtl="0" eaLnBrk="1" latinLnBrk="0" hangingPunct="1">
+        <a:defRPr sz="1502" kern="1200">
           <a:solidFill>
             <a:schemeClr val="tx1"/>
           </a:solidFill>
@@ -3291,8 +3373,8 @@
           <a:cs typeface="+mn-cs"/>
         </a:defRPr>
       </a:lvl6pPr>
-      <a:lvl7pPr marL="2743200" algn="l" defTabSz="914400" rtl="0" eaLnBrk="1" latinLnBrk="0" hangingPunct="1">
-        <a:defRPr sz="1800" kern="1200">
+      <a:lvl7pPr marL="2289749" algn="l" defTabSz="763250" rtl="0" eaLnBrk="1" latinLnBrk="0" hangingPunct="1">
+        <a:defRPr sz="1502" kern="1200">
           <a:solidFill>
             <a:schemeClr val="tx1"/>
           </a:solidFill>
@@ -3301,8 +3383,8 @@
           <a:cs typeface="+mn-cs"/>
         </a:defRPr>
       </a:lvl7pPr>
-      <a:lvl8pPr marL="3200400" algn="l" defTabSz="914400" rtl="0" eaLnBrk="1" latinLnBrk="0" hangingPunct="1">
-        <a:defRPr sz="1800" kern="1200">
+      <a:lvl8pPr marL="2671374" algn="l" defTabSz="763250" rtl="0" eaLnBrk="1" latinLnBrk="0" hangingPunct="1">
+        <a:defRPr sz="1502" kern="1200">
           <a:solidFill>
             <a:schemeClr val="tx1"/>
           </a:solidFill>
@@ -3311,8 +3393,8 @@
           <a:cs typeface="+mn-cs"/>
         </a:defRPr>
       </a:lvl8pPr>
-      <a:lvl9pPr marL="3657600" algn="l" defTabSz="914400" rtl="0" eaLnBrk="1" latinLnBrk="0" hangingPunct="1">
-        <a:defRPr sz="1800" kern="1200">
+      <a:lvl9pPr marL="3052999" algn="l" defTabSz="763250" rtl="0" eaLnBrk="1" latinLnBrk="0" hangingPunct="1">
+        <a:defRPr sz="1502" kern="1200">
           <a:solidFill>
             <a:schemeClr val="tx1"/>
           </a:solidFill>
@@ -3353,42 +3435,6 @@
       </p:grpSpPr>
       <p:pic>
         <p:nvPicPr>
-          <p:cNvPr id="17" name="Graphic 16" descr="Run">
-            <a:extLst>
-              <a:ext uri="{FF2B5EF4-FFF2-40B4-BE49-F238E27FC236}">
-                <a16:creationId xmlns:a16="http://schemas.microsoft.com/office/drawing/2014/main" id="{C16F756C-375D-4947-8F62-381EF528FD30}"/>
-              </a:ext>
-            </a:extLst>
-          </p:cNvPr>
-          <p:cNvPicPr>
-            <a:picLocks noChangeAspect="1"/>
-          </p:cNvPicPr>
-          <p:nvPr/>
-        </p:nvPicPr>
-        <p:blipFill>
-          <a:blip r:embed="rId2">
-            <a:extLst>
-              <a:ext uri="{96DAC541-7B7A-43D3-8B79-37D633B846F1}">
-                <asvg:svgBlip xmlns:asvg="http://schemas.microsoft.com/office/drawing/2016/SVG/main" r:embed="rId3"/>
-              </a:ext>
-            </a:extLst>
-          </a:blip>
-          <a:stretch>
-            <a:fillRect/>
-          </a:stretch>
-        </p:blipFill>
-        <p:spPr>
-          <a:xfrm>
-            <a:off x="3577881" y="1927162"/>
-            <a:ext cx="914400" cy="914400"/>
-          </a:xfrm>
-          <a:prstGeom prst="rect">
-            <a:avLst/>
-          </a:prstGeom>
-        </p:spPr>
-      </p:pic>
-      <p:pic>
-        <p:nvPicPr>
           <p:cNvPr id="18" name="Graphic 17" descr="Run">
             <a:extLst>
               <a:ext uri="{FF2B5EF4-FFF2-40B4-BE49-F238E27FC236}">
@@ -3402,10 +3448,10 @@
           <p:nvPr/>
         </p:nvPicPr>
         <p:blipFill>
-          <a:blip r:embed="rId4">
+          <a:blip r:embed="rId3">
             <a:extLst>
               <a:ext uri="{96DAC541-7B7A-43D3-8B79-37D633B846F1}">
-                <asvg:svgBlip xmlns:asvg="http://schemas.microsoft.com/office/drawing/2016/SVG/main" r:embed="rId5"/>
+                <asvg:svgBlip xmlns:asvg="http://schemas.microsoft.com/office/drawing/2016/SVG/main" r:embed="rId4"/>
               </a:ext>
             </a:extLst>
           </a:blip>
@@ -3415,8 +3461,8 @@
         </p:blipFill>
         <p:spPr>
           <a:xfrm>
-            <a:off x="3529828" y="3207731"/>
-            <a:ext cx="914400" cy="914400"/>
+            <a:off x="673235" y="2823476"/>
+            <a:ext cx="2050139" cy="2050139"/>
           </a:xfrm>
           <a:prstGeom prst="rect">
             <a:avLst/>
@@ -3437,8 +3483,8 @@
         </p:nvSpPr>
         <p:spPr>
           <a:xfrm>
-            <a:off x="4602827" y="2143427"/>
-            <a:ext cx="3950086" cy="584775"/>
+            <a:off x="2816229" y="1040255"/>
+            <a:ext cx="7411967" cy="1107996"/>
           </a:xfrm>
           <a:prstGeom prst="rect">
             <a:avLst/>
@@ -3452,7 +3498,7 @@
           <a:lstStyle/>
           <a:p>
             <a:r>
-              <a:rPr lang="en-US" sz="3200" dirty="0">
+              <a:rPr lang="en-US" sz="6600" dirty="0">
                 <a:solidFill>
                   <a:schemeClr val="tx1">
                     <a:lumMod val="50000"/>
@@ -3479,8 +3525,8 @@
         </p:nvSpPr>
         <p:spPr>
           <a:xfrm>
-            <a:off x="4602827" y="3126322"/>
-            <a:ext cx="4343464" cy="1077218"/>
+            <a:off x="2816229" y="2823476"/>
+            <a:ext cx="8715151" cy="2123658"/>
           </a:xfrm>
           <a:prstGeom prst="rect">
             <a:avLst/>
@@ -3494,7 +3540,7 @@
           <a:lstStyle/>
           <a:p>
             <a:r>
-              <a:rPr lang="en-US" sz="3200" dirty="0">
+              <a:rPr lang="en-US" sz="6600" dirty="0">
                 <a:solidFill>
                   <a:schemeClr val="tx1">
                     <a:lumMod val="50000"/>
@@ -3521,14 +3567,14 @@
         </p:nvSpPr>
         <p:spPr>
           <a:xfrm>
-            <a:off x="3299257" y="1655805"/>
-            <a:ext cx="5832387" cy="2879125"/>
+            <a:off x="2" y="9854"/>
+            <a:ext cx="12191999" cy="5728505"/>
           </a:xfrm>
           <a:prstGeom prst="rect">
             <a:avLst/>
           </a:prstGeom>
           <a:noFill/>
-          <a:ln w="38100">
+          <a:ln w="76200">
             <a:solidFill>
               <a:schemeClr val="tx1">
                 <a:lumMod val="50000"/>
@@ -3558,10 +3604,46 @@
           <a:lstStyle/>
           <a:p>
             <a:pPr algn="ctr"/>
-            <a:endParaRPr lang="en-US"/>
-          </a:p>
-        </p:txBody>
-      </p:sp>
+            <a:endParaRPr lang="en-US" sz="677"/>
+          </a:p>
+        </p:txBody>
+      </p:sp>
+      <p:pic>
+        <p:nvPicPr>
+          <p:cNvPr id="8" name="Graphic 7" descr="Run">
+            <a:extLst>
+              <a:ext uri="{FF2B5EF4-FFF2-40B4-BE49-F238E27FC236}">
+                <a16:creationId xmlns:a16="http://schemas.microsoft.com/office/drawing/2014/main" id="{CB4C6A05-9EA0-0343-B5F4-D8A484855F64}"/>
+              </a:ext>
+            </a:extLst>
+          </p:cNvPr>
+          <p:cNvPicPr>
+            <a:picLocks noChangeAspect="1"/>
+          </p:cNvPicPr>
+          <p:nvPr/>
+        </p:nvPicPr>
+        <p:blipFill>
+          <a:blip r:embed="rId5">
+            <a:extLst>
+              <a:ext uri="{96DAC541-7B7A-43D3-8B79-37D633B846F1}">
+                <asvg:svgBlip xmlns:asvg="http://schemas.microsoft.com/office/drawing/2016/SVG/main" r:embed="rId6"/>
+              </a:ext>
+            </a:extLst>
+          </a:blip>
+          <a:stretch>
+            <a:fillRect/>
+          </a:stretch>
+        </p:blipFill>
+        <p:spPr>
+          <a:xfrm>
+            <a:off x="673235" y="569183"/>
+            <a:ext cx="2050139" cy="2050139"/>
+          </a:xfrm>
+          <a:prstGeom prst="rect">
+            <a:avLst/>
+          </a:prstGeom>
+        </p:spPr>
+      </p:pic>
     </p:spTree>
     <p:extLst>
       <p:ext uri="{BB962C8B-B14F-4D97-AF65-F5344CB8AC3E}">
@@ -3575,224 +3657,268 @@
 </p:sld>
 </file>
 
-<file path=ppt/slides/slide2.xml><?xml version="1.0" encoding="utf-8"?>
-<p:sld xmlns:a="http://schemas.openxmlformats.org/drawingml/2006/main" xmlns:r="http://schemas.openxmlformats.org/officeDocument/2006/relationships" xmlns:p="http://schemas.openxmlformats.org/presentationml/2006/main">
-  <p:cSld>
-    <p:spTree>
-      <p:nvGrpSpPr>
-        <p:cNvPr id="1" name=""/>
-        <p:cNvGrpSpPr/>
-        <p:nvPr/>
-      </p:nvGrpSpPr>
-      <p:grpSpPr>
-        <a:xfrm>
-          <a:off x="0" y="0"/>
-          <a:ext cx="0" cy="0"/>
-          <a:chOff x="0" y="0"/>
-          <a:chExt cx="0" cy="0"/>
-        </a:xfrm>
-      </p:grpSpPr>
-      <p:sp>
-        <p:nvSpPr>
-          <p:cNvPr id="2" name="Title 1">
-            <a:extLst>
-              <a:ext uri="{FF2B5EF4-FFF2-40B4-BE49-F238E27FC236}">
-                <a16:creationId xmlns:a16="http://schemas.microsoft.com/office/drawing/2014/main" id="{ECCBAC47-5646-1D49-A5C2-83750D470E5C}"/>
-              </a:ext>
-            </a:extLst>
-          </p:cNvPr>
-          <p:cNvSpPr>
-            <a:spLocks noGrp="1"/>
-          </p:cNvSpPr>
-          <p:nvPr>
-            <p:ph type="title"/>
-          </p:nvPr>
-        </p:nvSpPr>
-        <p:spPr/>
-        <p:txBody>
-          <a:bodyPr/>
-          <a:lstStyle/>
-          <a:p>
-            <a:endParaRPr lang="en-US"/>
-          </a:p>
-        </p:txBody>
-      </p:sp>
-      <p:sp>
-        <p:nvSpPr>
-          <p:cNvPr id="3" name="Content Placeholder 2">
-            <a:extLst>
-              <a:ext uri="{FF2B5EF4-FFF2-40B4-BE49-F238E27FC236}">
-                <a16:creationId xmlns:a16="http://schemas.microsoft.com/office/drawing/2014/main" id="{C5065583-D353-DC48-9257-01F2BE871FBF}"/>
-              </a:ext>
-            </a:extLst>
-          </p:cNvPr>
-          <p:cNvSpPr>
-            <a:spLocks noGrp="1"/>
-          </p:cNvSpPr>
-          <p:nvPr>
-            <p:ph idx="1"/>
-          </p:nvPr>
-        </p:nvSpPr>
-        <p:spPr/>
-        <p:txBody>
-          <a:bodyPr/>
-          <a:lstStyle/>
-          <a:p>
-            <a:endParaRPr lang="en-US"/>
-          </a:p>
-        </p:txBody>
-      </p:sp>
-      <p:pic>
-        <p:nvPicPr>
-          <p:cNvPr id="4" name="Picture 3">
-            <a:extLst>
-              <a:ext uri="{FF2B5EF4-FFF2-40B4-BE49-F238E27FC236}">
-                <a16:creationId xmlns:a16="http://schemas.microsoft.com/office/drawing/2014/main" id="{D5AE5E67-FFD2-9F4E-A62E-787FE7536C4B}"/>
-              </a:ext>
-            </a:extLst>
-          </p:cNvPr>
-          <p:cNvPicPr>
-            <a:picLocks noChangeAspect="1"/>
-          </p:cNvPicPr>
-          <p:nvPr/>
-        </p:nvPicPr>
-        <p:blipFill>
-          <a:blip r:embed="rId2">
-            <a:duotone>
-              <a:prstClr val="black"/>
-              <a:srgbClr val="00B050">
-                <a:tint val="45000"/>
-                <a:satMod val="400000"/>
+<file path=ppt/theme/theme1.xml><?xml version="1.0" encoding="utf-8"?>
+<a:theme xmlns:a="http://schemas.openxmlformats.org/drawingml/2006/main" name="Office Theme">
+  <a:themeElements>
+    <a:clrScheme name="Office Theme">
+      <a:dk1>
+        <a:sysClr val="windowText" lastClr="000000"/>
+      </a:dk1>
+      <a:lt1>
+        <a:sysClr val="window" lastClr="FFFFFF"/>
+      </a:lt1>
+      <a:dk2>
+        <a:srgbClr val="44546A"/>
+      </a:dk2>
+      <a:lt2>
+        <a:srgbClr val="E7E6E6"/>
+      </a:lt2>
+      <a:accent1>
+        <a:srgbClr val="4472C4"/>
+      </a:accent1>
+      <a:accent2>
+        <a:srgbClr val="ED7D31"/>
+      </a:accent2>
+      <a:accent3>
+        <a:srgbClr val="A5A5A5"/>
+      </a:accent3>
+      <a:accent4>
+        <a:srgbClr val="FFC000"/>
+      </a:accent4>
+      <a:accent5>
+        <a:srgbClr val="5B9BD5"/>
+      </a:accent5>
+      <a:accent6>
+        <a:srgbClr val="70AD47"/>
+      </a:accent6>
+      <a:hlink>
+        <a:srgbClr val="0563C1"/>
+      </a:hlink>
+      <a:folHlink>
+        <a:srgbClr val="954F72"/>
+      </a:folHlink>
+    </a:clrScheme>
+    <a:fontScheme name="Office Theme">
+      <a:majorFont>
+        <a:latin typeface="Calibri Light" panose="020F0302020204030204"/>
+        <a:ea typeface=""/>
+        <a:cs typeface=""/>
+        <a:font script="Jpan" typeface="游ゴシック Light"/>
+        <a:font script="Hang" typeface="맑은 고딕"/>
+        <a:font script="Hans" typeface="等线 Light"/>
+        <a:font script="Hant" typeface="新細明體"/>
+        <a:font script="Arab" typeface="Times New Roman"/>
+        <a:font script="Hebr" typeface="Times New Roman"/>
+        <a:font script="Thai" typeface="Angsana New"/>
+        <a:font script="Ethi" typeface="Nyala"/>
+        <a:font script="Beng" typeface="Vrinda"/>
+        <a:font script="Gujr" typeface="Shruti"/>
+        <a:font script="Khmr" typeface="MoolBoran"/>
+        <a:font script="Knda" typeface="Tunga"/>
+        <a:font script="Guru" typeface="Raavi"/>
+        <a:font script="Cans" typeface="Euphemia"/>
+        <a:font script="Cher" typeface="Plantagenet Cherokee"/>
+        <a:font script="Yiii" typeface="Microsoft Yi Baiti"/>
+        <a:font script="Tibt" typeface="Microsoft Himalaya"/>
+        <a:font script="Thaa" typeface="MV Boli"/>
+        <a:font script="Deva" typeface="Mangal"/>
+        <a:font script="Telu" typeface="Gautami"/>
+        <a:font script="Taml" typeface="Latha"/>
+        <a:font script="Syrc" typeface="Estrangelo Edessa"/>
+        <a:font script="Orya" typeface="Kalinga"/>
+        <a:font script="Mlym" typeface="Kartika"/>
+        <a:font script="Laoo" typeface="DokChampa"/>
+        <a:font script="Sinh" typeface="Iskoola Pota"/>
+        <a:font script="Mong" typeface="Mongolian Baiti"/>
+        <a:font script="Viet" typeface="Times New Roman"/>
+        <a:font script="Uigh" typeface="Microsoft Uighur"/>
+        <a:font script="Geor" typeface="Sylfaen"/>
+      </a:majorFont>
+      <a:minorFont>
+        <a:latin typeface="Calibri" panose="020F0502020204030204"/>
+        <a:ea typeface=""/>
+        <a:cs typeface=""/>
+        <a:font script="Jpan" typeface="游ゴシック"/>
+        <a:font script="Hang" typeface="맑은 고딕"/>
+        <a:font script="Hans" typeface="等线"/>
+        <a:font script="Hant" typeface="新細明體"/>
+        <a:font script="Arab" typeface="Arial"/>
+        <a:font script="Hebr" typeface="Arial"/>
+        <a:font script="Thai" typeface="Cordia New"/>
+        <a:font script="Ethi" typeface="Nyala"/>
+        <a:font script="Beng" typeface="Vrinda"/>
+        <a:font script="Gujr" typeface="Shruti"/>
+        <a:font script="Khmr" typeface="DaunPenh"/>
+        <a:font script="Knda" typeface="Tunga"/>
+        <a:font script="Guru" typeface="Raavi"/>
+        <a:font script="Cans" typeface="Euphemia"/>
+        <a:font script="Cher" typeface="Plantagenet Cherokee"/>
+        <a:font script="Yiii" typeface="Microsoft Yi Baiti"/>
+        <a:font script="Tibt" typeface="Microsoft Himalaya"/>
+        <a:font script="Thaa" typeface="MV Boli"/>
+        <a:font script="Deva" typeface="Mangal"/>
+        <a:font script="Telu" typeface="Gautami"/>
+        <a:font script="Taml" typeface="Latha"/>
+        <a:font script="Syrc" typeface="Estrangelo Edessa"/>
+        <a:font script="Orya" typeface="Kalinga"/>
+        <a:font script="Mlym" typeface="Kartika"/>
+        <a:font script="Laoo" typeface="DokChampa"/>
+        <a:font script="Sinh" typeface="Iskoola Pota"/>
+        <a:font script="Mong" typeface="Mongolian Baiti"/>
+        <a:font script="Viet" typeface="Arial"/>
+        <a:font script="Uigh" typeface="Microsoft Uighur"/>
+        <a:font script="Geor" typeface="Sylfaen"/>
+      </a:minorFont>
+    </a:fontScheme>
+    <a:fmtScheme name="Office Theme">
+      <a:fillStyleLst>
+        <a:solidFill>
+          <a:schemeClr val="phClr"/>
+        </a:solidFill>
+        <a:gradFill rotWithShape="1">
+          <a:gsLst>
+            <a:gs pos="0">
+              <a:schemeClr val="phClr">
+                <a:lumMod val="110000"/>
+                <a:satMod val="105000"/>
+                <a:tint val="67000"/>
+              </a:schemeClr>
+            </a:gs>
+            <a:gs pos="50000">
+              <a:schemeClr val="phClr">
+                <a:lumMod val="105000"/>
+                <a:satMod val="103000"/>
+                <a:tint val="73000"/>
+              </a:schemeClr>
+            </a:gs>
+            <a:gs pos="100000">
+              <a:schemeClr val="phClr">
+                <a:lumMod val="105000"/>
+                <a:satMod val="109000"/>
+                <a:tint val="81000"/>
+              </a:schemeClr>
+            </a:gs>
+          </a:gsLst>
+          <a:lin ang="5400000" scaled="0"/>
+        </a:gradFill>
+        <a:gradFill rotWithShape="1">
+          <a:gsLst>
+            <a:gs pos="0">
+              <a:schemeClr val="phClr">
+                <a:satMod val="103000"/>
+                <a:lumMod val="102000"/>
+                <a:tint val="94000"/>
+              </a:schemeClr>
+            </a:gs>
+            <a:gs pos="50000">
+              <a:schemeClr val="phClr">
+                <a:satMod val="110000"/>
+                <a:lumMod val="100000"/>
+                <a:shade val="100000"/>
+              </a:schemeClr>
+            </a:gs>
+            <a:gs pos="100000">
+              <a:schemeClr val="phClr">
+                <a:lumMod val="99000"/>
+                <a:satMod val="120000"/>
+                <a:shade val="78000"/>
+              </a:schemeClr>
+            </a:gs>
+          </a:gsLst>
+          <a:lin ang="5400000" scaled="0"/>
+        </a:gradFill>
+      </a:fillStyleLst>
+      <a:lnStyleLst>
+        <a:ln w="6350" cap="flat" cmpd="sng" algn="ctr">
+          <a:solidFill>
+            <a:schemeClr val="phClr"/>
+          </a:solidFill>
+          <a:prstDash val="solid"/>
+          <a:miter lim="800000"/>
+        </a:ln>
+        <a:ln w="12700" cap="flat" cmpd="sng" algn="ctr">
+          <a:solidFill>
+            <a:schemeClr val="phClr"/>
+          </a:solidFill>
+          <a:prstDash val="solid"/>
+          <a:miter lim="800000"/>
+        </a:ln>
+        <a:ln w="19050" cap="flat" cmpd="sng" algn="ctr">
+          <a:solidFill>
+            <a:schemeClr val="phClr"/>
+          </a:solidFill>
+          <a:prstDash val="solid"/>
+          <a:miter lim="800000"/>
+        </a:ln>
+      </a:lnStyleLst>
+      <a:effectStyleLst>
+        <a:effectStyle>
+          <a:effectLst/>
+        </a:effectStyle>
+        <a:effectStyle>
+          <a:effectLst/>
+        </a:effectStyle>
+        <a:effectStyle>
+          <a:effectLst>
+            <a:outerShdw blurRad="57150" dist="19050" dir="5400000" algn="ctr" rotWithShape="0">
+              <a:srgbClr val="000000">
+                <a:alpha val="63000"/>
               </a:srgbClr>
-            </a:duotone>
-            <a:extLst>
-              <a:ext uri="{BEBA8EAE-BF5A-486C-A8C5-ECC9F3942E4B}">
-                <a14:imgProps xmlns:a14="http://schemas.microsoft.com/office/drawing/2010/main">
-                  <a14:imgLayer r:embed="rId3">
-                    <a14:imgEffect>
-                      <a14:artisticPhotocopy/>
-                    </a14:imgEffect>
-                    <a14:imgEffect>
-                      <a14:brightnessContrast bright="-40000" contrast="-40000"/>
-                    </a14:imgEffect>
-                  </a14:imgLayer>
-                </a14:imgProps>
-              </a:ext>
-            </a:extLst>
-          </a:blip>
-          <a:stretch>
-            <a:fillRect/>
-          </a:stretch>
-        </p:blipFill>
-        <p:spPr>
-          <a:xfrm>
-            <a:off x="3566898" y="4816601"/>
-            <a:ext cx="3847157" cy="839380"/>
-          </a:xfrm>
-          <a:prstGeom prst="rect">
-            <a:avLst/>
-          </a:prstGeom>
-        </p:spPr>
-      </p:pic>
-      <p:sp>
-        <p:nvSpPr>
-          <p:cNvPr id="5" name="TextBox 4">
-            <a:extLst>
-              <a:ext uri="{FF2B5EF4-FFF2-40B4-BE49-F238E27FC236}">
-                <a16:creationId xmlns:a16="http://schemas.microsoft.com/office/drawing/2014/main" id="{FA084728-CDE7-864C-9E42-C35BF5D105D6}"/>
-              </a:ext>
-            </a:extLst>
-          </p:cNvPr>
-          <p:cNvSpPr txBox="1"/>
-          <p:nvPr/>
-        </p:nvSpPr>
-        <p:spPr>
-          <a:xfrm>
-            <a:off x="6096000" y="4051012"/>
-            <a:ext cx="1070747" cy="584775"/>
-          </a:xfrm>
-          <a:prstGeom prst="rect">
-            <a:avLst/>
-          </a:prstGeom>
-          <a:noFill/>
-        </p:spPr>
-        <p:txBody>
-          <a:bodyPr wrap="square" rtlCol="0">
-            <a:spAutoFit/>
-          </a:bodyPr>
-          <a:lstStyle/>
-          <a:p>
-            <a:pPr algn="ctr"/>
-            <a:r>
-              <a:rPr lang="en-US" sz="3200" dirty="0"/>
-              <a:t>VS</a:t>
-            </a:r>
-          </a:p>
-        </p:txBody>
-      </p:sp>
-      <p:pic>
-        <p:nvPicPr>
-          <p:cNvPr id="6" name="Picture 5">
-            <a:extLst>
-              <a:ext uri="{FF2B5EF4-FFF2-40B4-BE49-F238E27FC236}">
-                <a16:creationId xmlns:a16="http://schemas.microsoft.com/office/drawing/2014/main" id="{8CDB2C9D-2C74-F54A-B89B-B68344019DAE}"/>
-              </a:ext>
-            </a:extLst>
-          </p:cNvPr>
-          <p:cNvPicPr>
-            <a:picLocks noChangeAspect="1"/>
-          </p:cNvPicPr>
-          <p:nvPr/>
-        </p:nvPicPr>
-        <p:blipFill>
-          <a:blip r:embed="rId4">
-            <a:duotone>
-              <a:schemeClr val="accent1">
-                <a:shade val="45000"/>
-                <a:satMod val="135000"/>
+            </a:outerShdw>
+          </a:effectLst>
+        </a:effectStyle>
+      </a:effectStyleLst>
+      <a:bgFillStyleLst>
+        <a:solidFill>
+          <a:schemeClr val="phClr"/>
+        </a:solidFill>
+        <a:solidFill>
+          <a:schemeClr val="phClr">
+            <a:tint val="95000"/>
+            <a:satMod val="170000"/>
+          </a:schemeClr>
+        </a:solidFill>
+        <a:gradFill rotWithShape="1">
+          <a:gsLst>
+            <a:gs pos="0">
+              <a:schemeClr val="phClr">
+                <a:tint val="93000"/>
+                <a:satMod val="150000"/>
+                <a:shade val="98000"/>
+                <a:lumMod val="102000"/>
               </a:schemeClr>
-              <a:prstClr val="white"/>
-            </a:duotone>
-            <a:extLst>
-              <a:ext uri="{BEBA8EAE-BF5A-486C-A8C5-ECC9F3942E4B}">
-                <a14:imgProps xmlns:a14="http://schemas.microsoft.com/office/drawing/2010/main">
-                  <a14:imgLayer r:embed="rId5">
-                    <a14:imgEffect>
-                      <a14:artisticGlowEdges/>
-                    </a14:imgEffect>
-                  </a14:imgLayer>
-                </a14:imgProps>
-              </a:ext>
-            </a:extLst>
-          </a:blip>
-          <a:stretch>
-            <a:fillRect/>
-          </a:stretch>
-        </p:blipFill>
-        <p:spPr>
-          <a:xfrm>
-            <a:off x="3852519" y="4007995"/>
-            <a:ext cx="2511168" cy="627792"/>
-          </a:xfrm>
-          <a:prstGeom prst="rect">
-            <a:avLst/>
-          </a:prstGeom>
-        </p:spPr>
-      </p:pic>
-    </p:spTree>
-    <p:extLst>
-      <p:ext uri="{BB962C8B-B14F-4D97-AF65-F5344CB8AC3E}">
-        <p14:creationId xmlns:p14="http://schemas.microsoft.com/office/powerpoint/2010/main" val="186220918"/>
-      </p:ext>
-    </p:extLst>
-  </p:cSld>
-  <p:clrMapOvr>
-    <a:masterClrMapping/>
-  </p:clrMapOvr>
-</p:sld>
+            </a:gs>
+            <a:gs pos="50000">
+              <a:schemeClr val="phClr">
+                <a:tint val="98000"/>
+                <a:satMod val="130000"/>
+                <a:shade val="90000"/>
+                <a:lumMod val="103000"/>
+              </a:schemeClr>
+            </a:gs>
+            <a:gs pos="100000">
+              <a:schemeClr val="phClr">
+                <a:shade val="63000"/>
+                <a:satMod val="120000"/>
+              </a:schemeClr>
+            </a:gs>
+          </a:gsLst>
+          <a:lin ang="5400000" scaled="0"/>
+        </a:gradFill>
+      </a:bgFillStyleLst>
+    </a:fmtScheme>
+  </a:themeElements>
+  <a:objectDefaults/>
+  <a:extraClrSchemeLst/>
+  <a:extLst>
+    <a:ext uri="{05A4C25C-085E-4340-85A3-A5531E510DB2}">
+      <thm15:themeFamily xmlns:thm15="http://schemas.microsoft.com/office/thememl/2012/main" name="Office Theme" id="{62F939B6-93AF-4DB8-9C6B-D6C7DFDC589F}" vid="{4A3C46E8-61CC-4603-A589-7422A47A8E4A}"/>
+    </a:ext>
+  </a:extLst>
+</a:theme>
 </file>
 
-<file path=ppt/theme/theme1.xml><?xml version="1.0" encoding="utf-8"?>
+<file path=ppt/theme/theme2.xml><?xml version="1.0" encoding="utf-8"?>
 <a:theme xmlns:a="http://schemas.openxmlformats.org/drawingml/2006/main" name="Office Theme">
   <a:themeElements>
     <a:clrScheme name="Office">

</xml_diff>